<commit_message>
Fixed based on experience teaching the class
</commit_message>
<xml_diff>
--- a/lesson-520-developing-with-rdds/slides/developing-with-rdds.pptx
+++ b/lesson-520-developing-with-rdds/slides/developing-with-rdds.pptx
@@ -249,7 +249,7 @@
             <a:fld id="{7E6858BF-E995-6B4A-A066-18CA04BBA799}" type="datetimeFigureOut">
               <a:rPr lang="en-US" smtClean="0"/>
               <a:pPr/>
-              <a:t>5/5/18</a:t>
+              <a:t>5/7/18</a:t>
             </a:fld>
             <a:endParaRPr lang="en-US"/>
           </a:p>
@@ -417,7 +417,7 @@
             <a:fld id="{D88695E9-1DC5-9344-A1C3-9069609C108C}" type="datetimeFigureOut">
               <a:rPr lang="en-US" smtClean="0"/>
               <a:pPr/>
-              <a:t>5/5/18</a:t>
+              <a:t>5/7/18</a:t>
             </a:fld>
             <a:endParaRPr lang="en-US"/>
           </a:p>
@@ -771,6 +771,91 @@
 </p:notes>
 </file>
 
+<file path=ppt/notesSlides/notesSlide2.xml><?xml version="1.0" encoding="utf-8"?>
+<p:notes xmlns:a="http://schemas.openxmlformats.org/drawingml/2006/main" xmlns:r="http://schemas.openxmlformats.org/officeDocument/2006/relationships" xmlns:p="http://schemas.openxmlformats.org/presentationml/2006/main">
+  <p:cSld>
+    <p:spTree>
+      <p:nvGrpSpPr>
+        <p:cNvPr id="1" name=""/>
+        <p:cNvGrpSpPr/>
+        <p:nvPr/>
+      </p:nvGrpSpPr>
+      <p:grpSpPr>
+        <a:xfrm>
+          <a:off x="0" y="0"/>
+          <a:ext cx="0" cy="0"/>
+          <a:chOff x="0" y="0"/>
+          <a:chExt cx="0" cy="0"/>
+        </a:xfrm>
+      </p:grpSpPr>
+      <p:sp>
+        <p:nvSpPr>
+          <p:cNvPr id="2" name="Slide Image Placeholder 1"/>
+          <p:cNvSpPr>
+            <a:spLocks noGrp="1" noRot="1" noChangeAspect="1"/>
+          </p:cNvSpPr>
+          <p:nvPr>
+            <p:ph type="sldImg"/>
+          </p:nvPr>
+        </p:nvSpPr>
+        <p:spPr/>
+      </p:sp>
+      <p:sp>
+        <p:nvSpPr>
+          <p:cNvPr id="3" name="Notes Placeholder 2"/>
+          <p:cNvSpPr>
+            <a:spLocks noGrp="1"/>
+          </p:cNvSpPr>
+          <p:nvPr>
+            <p:ph type="body" idx="1"/>
+          </p:nvPr>
+        </p:nvSpPr>
+        <p:spPr/>
+        <p:txBody>
+          <a:bodyPr/>
+          <a:lstStyle/>
+          <a:p>
+            <a:endParaRPr lang="en-US" dirty="0"/>
+          </a:p>
+        </p:txBody>
+      </p:sp>
+      <p:sp>
+        <p:nvSpPr>
+          <p:cNvPr id="4" name="Slide Number Placeholder 3"/>
+          <p:cNvSpPr>
+            <a:spLocks noGrp="1"/>
+          </p:cNvSpPr>
+          <p:nvPr>
+            <p:ph type="sldNum" sz="quarter" idx="10"/>
+          </p:nvPr>
+        </p:nvSpPr>
+        <p:spPr/>
+        <p:txBody>
+          <a:bodyPr/>
+          <a:lstStyle/>
+          <a:p>
+            <a:fld id="{67FF319C-988A-5846-9E9C-782AF28753F1}" type="slidenum">
+              <a:rPr lang="en-US" smtClean="0"/>
+              <a:pPr/>
+              <a:t>5</a:t>
+            </a:fld>
+            <a:endParaRPr lang="en-US"/>
+          </a:p>
+        </p:txBody>
+      </p:sp>
+    </p:spTree>
+    <p:extLst>
+      <p:ext uri="{BB962C8B-B14F-4D97-AF65-F5344CB8AC3E}">
+        <p14:creationId xmlns:p14="http://schemas.microsoft.com/office/powerpoint/2010/main" val="161017820"/>
+      </p:ext>
+    </p:extLst>
+  </p:cSld>
+  <p:clrMapOvr>
+    <a:masterClrMapping/>
+  </p:clrMapOvr>
+</p:notes>
+</file>
+
 <file path=ppt/slideLayouts/slideLayout1.xml><?xml version="1.0" encoding="utf-8"?>
 <p:sldLayout xmlns:a="http://schemas.openxmlformats.org/drawingml/2006/main" xmlns:r="http://schemas.openxmlformats.org/officeDocument/2006/relationships" xmlns:p="http://schemas.openxmlformats.org/presentationml/2006/main" preserve="1" userDrawn="1">
   <p:cSld name="1_General Slide">
@@ -1047,14 +1132,14 @@
           </a:ln>
           <a:extLst>
             <a:ext uri="{909E8E84-426E-40dd-AFC4-6F175D3DCCD1}">
-              <a14:hiddenFill xmlns="" xmlns:a14="http://schemas.microsoft.com/office/drawing/2010/main">
+              <a14:hiddenFill xmlns:a14="http://schemas.microsoft.com/office/drawing/2010/main" xmlns="">
                 <a:solidFill>
                   <a:srgbClr val="FFFFFF"/>
                 </a:solidFill>
               </a14:hiddenFill>
             </a:ext>
             <a:ext uri="{91240B29-F687-4f45-9708-019B960494DF}">
-              <a14:hiddenLine xmlns="" xmlns:a14="http://schemas.microsoft.com/office/drawing/2010/main" w="9525">
+              <a14:hiddenLine xmlns:a14="http://schemas.microsoft.com/office/drawing/2010/main" xmlns="" w="9525">
                 <a:solidFill>
                   <a:srgbClr val="000000"/>
                 </a:solidFill>
@@ -1143,14 +1228,14 @@
           <a:effectLst/>
           <a:extLst>
             <a:ext uri="{909E8E84-426E-40dd-AFC4-6F175D3DCCD1}">
-              <a14:hiddenFill xmlns="" xmlns:a14="http://schemas.microsoft.com/office/drawing/2010/main">
+              <a14:hiddenFill xmlns:a14="http://schemas.microsoft.com/office/drawing/2010/main" xmlns="">
                 <a:solidFill>
                   <a:srgbClr val="FFFFFF"/>
                 </a:solidFill>
               </a14:hiddenFill>
             </a:ext>
             <a:ext uri="{91240B29-F687-4f45-9708-019B960494DF}">
-              <a14:hiddenLine xmlns="" xmlns:a14="http://schemas.microsoft.com/office/drawing/2010/main" w="12700">
+              <a14:hiddenLine xmlns:a14="http://schemas.microsoft.com/office/drawing/2010/main" xmlns="" w="12700">
                 <a:solidFill>
                   <a:srgbClr val="000000"/>
                 </a:solidFill>
@@ -1160,7 +1245,7 @@
               </a14:hiddenLine>
             </a:ext>
             <a:ext uri="{AF507438-7753-43e0-B8FC-AC1667EBCBE1}">
-              <a14:hiddenEffects xmlns="" xmlns:a14="http://schemas.microsoft.com/office/drawing/2010/main">
+              <a14:hiddenEffects xmlns:a14="http://schemas.microsoft.com/office/drawing/2010/main" xmlns="">
                 <a:effectLst>
                   <a:outerShdw blurRad="63500" dist="38099" dir="2700000" algn="ctr" rotWithShape="0">
                     <a:srgbClr val="000000">
@@ -1567,14 +1652,14 @@
           <a:effectLst/>
           <a:extLst>
             <a:ext uri="{909E8E84-426E-40dd-AFC4-6F175D3DCCD1}">
-              <a14:hiddenFill xmlns="" xmlns:a14="http://schemas.microsoft.com/office/drawing/2010/main">
+              <a14:hiddenFill xmlns:a14="http://schemas.microsoft.com/office/drawing/2010/main" xmlns="">
                 <a:solidFill>
                   <a:srgbClr val="FFFFFF"/>
                 </a:solidFill>
               </a14:hiddenFill>
             </a:ext>
             <a:ext uri="{91240B29-F687-4f45-9708-019B960494DF}">
-              <a14:hiddenLine xmlns="" xmlns:a14="http://schemas.microsoft.com/office/drawing/2010/main" w="12700">
+              <a14:hiddenLine xmlns:a14="http://schemas.microsoft.com/office/drawing/2010/main" xmlns="" w="12700">
                 <a:solidFill>
                   <a:srgbClr val="000000"/>
                 </a:solidFill>
@@ -1584,7 +1669,7 @@
               </a14:hiddenLine>
             </a:ext>
             <a:ext uri="{AF507438-7753-43e0-B8FC-AC1667EBCBE1}">
-              <a14:hiddenEffects xmlns="" xmlns:a14="http://schemas.microsoft.com/office/drawing/2010/main">
+              <a14:hiddenEffects xmlns:a14="http://schemas.microsoft.com/office/drawing/2010/main" xmlns="">
                 <a:effectLst>
                   <a:outerShdw blurRad="63500" dist="38099" dir="2700000" algn="ctr" rotWithShape="0">
                     <a:srgbClr val="000000">
@@ -1745,14 +1830,14 @@
           </a:ln>
           <a:extLst>
             <a:ext uri="{909E8E84-426E-40dd-AFC4-6F175D3DCCD1}">
-              <a14:hiddenFill xmlns="" xmlns:a14="http://schemas.microsoft.com/office/drawing/2010/main">
+              <a14:hiddenFill xmlns:a14="http://schemas.microsoft.com/office/drawing/2010/main" xmlns="">
                 <a:solidFill>
                   <a:srgbClr val="FFFFFF"/>
                 </a:solidFill>
               </a14:hiddenFill>
             </a:ext>
             <a:ext uri="{91240B29-F687-4f45-9708-019B960494DF}">
-              <a14:hiddenLine xmlns="" xmlns:a14="http://schemas.microsoft.com/office/drawing/2010/main" w="9525">
+              <a14:hiddenLine xmlns:a14="http://schemas.microsoft.com/office/drawing/2010/main" xmlns="" w="9525">
                 <a:solidFill>
                   <a:srgbClr val="000000"/>
                 </a:solidFill>
@@ -2079,14 +2164,14 @@
           <a:effectLst/>
           <a:extLst>
             <a:ext uri="{909E8E84-426E-40dd-AFC4-6F175D3DCCD1}">
-              <a14:hiddenFill xmlns="" xmlns:a14="http://schemas.microsoft.com/office/drawing/2010/main">
+              <a14:hiddenFill xmlns:a14="http://schemas.microsoft.com/office/drawing/2010/main" xmlns="">
                 <a:solidFill>
                   <a:srgbClr val="FFFFFF"/>
                 </a:solidFill>
               </a14:hiddenFill>
             </a:ext>
             <a:ext uri="{91240B29-F687-4f45-9708-019B960494DF}">
-              <a14:hiddenLine xmlns="" xmlns:a14="http://schemas.microsoft.com/office/drawing/2010/main" w="12700">
+              <a14:hiddenLine xmlns:a14="http://schemas.microsoft.com/office/drawing/2010/main" xmlns="" w="12700">
                 <a:solidFill>
                   <a:srgbClr val="000000"/>
                 </a:solidFill>
@@ -2096,7 +2181,7 @@
               </a14:hiddenLine>
             </a:ext>
             <a:ext uri="{AF507438-7753-43e0-B8FC-AC1667EBCBE1}">
-              <a14:hiddenEffects xmlns="" xmlns:a14="http://schemas.microsoft.com/office/drawing/2010/main">
+              <a14:hiddenEffects xmlns:a14="http://schemas.microsoft.com/office/drawing/2010/main" xmlns="">
                 <a:effectLst>
                   <a:outerShdw blurRad="63500" dist="38099" dir="2700000" algn="ctr" rotWithShape="0">
                     <a:srgbClr val="000000">
@@ -2327,14 +2412,14 @@
           </a:ln>
           <a:extLst>
             <a:ext uri="{909E8E84-426E-40dd-AFC4-6F175D3DCCD1}">
-              <a14:hiddenFill xmlns="" xmlns:a14="http://schemas.microsoft.com/office/drawing/2010/main">
+              <a14:hiddenFill xmlns:a14="http://schemas.microsoft.com/office/drawing/2010/main" xmlns="">
                 <a:solidFill>
                   <a:srgbClr val="FFFFFF"/>
                 </a:solidFill>
               </a14:hiddenFill>
             </a:ext>
             <a:ext uri="{91240B29-F687-4f45-9708-019B960494DF}">
-              <a14:hiddenLine xmlns="" xmlns:a14="http://schemas.microsoft.com/office/drawing/2010/main" w="9525">
+              <a14:hiddenLine xmlns:a14="http://schemas.microsoft.com/office/drawing/2010/main" xmlns="" w="9525">
                 <a:solidFill>
                   <a:srgbClr val="000000"/>
                 </a:solidFill>
@@ -2690,14 +2775,14 @@
           <a:effectLst/>
           <a:extLst>
             <a:ext uri="{909E8E84-426E-40dd-AFC4-6F175D3DCCD1}">
-              <a14:hiddenFill xmlns="" xmlns:a14="http://schemas.microsoft.com/office/drawing/2010/main">
+              <a14:hiddenFill xmlns:a14="http://schemas.microsoft.com/office/drawing/2010/main" xmlns="">
                 <a:solidFill>
                   <a:srgbClr val="FFFFFF"/>
                 </a:solidFill>
               </a14:hiddenFill>
             </a:ext>
             <a:ext uri="{91240B29-F687-4f45-9708-019B960494DF}">
-              <a14:hiddenLine xmlns="" xmlns:a14="http://schemas.microsoft.com/office/drawing/2010/main" w="12700">
+              <a14:hiddenLine xmlns:a14="http://schemas.microsoft.com/office/drawing/2010/main" xmlns="" w="12700">
                 <a:solidFill>
                   <a:srgbClr val="000000"/>
                 </a:solidFill>
@@ -2707,7 +2792,7 @@
               </a14:hiddenLine>
             </a:ext>
             <a:ext uri="{AF507438-7753-43e0-B8FC-AC1667EBCBE1}">
-              <a14:hiddenEffects xmlns="" xmlns:a14="http://schemas.microsoft.com/office/drawing/2010/main">
+              <a14:hiddenEffects xmlns:a14="http://schemas.microsoft.com/office/drawing/2010/main" xmlns="">
                 <a:effectLst>
                   <a:outerShdw blurRad="63500" dist="38099" dir="2700000" algn="ctr" rotWithShape="0">
                     <a:srgbClr val="000000">
@@ -2938,14 +3023,14 @@
           </a:ln>
           <a:extLst>
             <a:ext uri="{909E8E84-426E-40dd-AFC4-6F175D3DCCD1}">
-              <a14:hiddenFill xmlns="" xmlns:a14="http://schemas.microsoft.com/office/drawing/2010/main">
+              <a14:hiddenFill xmlns:a14="http://schemas.microsoft.com/office/drawing/2010/main" xmlns="">
                 <a:solidFill>
                   <a:srgbClr val="FFFFFF"/>
                 </a:solidFill>
               </a14:hiddenFill>
             </a:ext>
             <a:ext uri="{91240B29-F687-4f45-9708-019B960494DF}">
-              <a14:hiddenLine xmlns="" xmlns:a14="http://schemas.microsoft.com/office/drawing/2010/main" w="9525">
+              <a14:hiddenLine xmlns:a14="http://schemas.microsoft.com/office/drawing/2010/main" xmlns="" w="9525">
                 <a:solidFill>
                   <a:srgbClr val="000000"/>
                 </a:solidFill>
@@ -3738,14 +3823,14 @@
           <a:effectLst/>
           <a:extLst>
             <a:ext uri="{909E8E84-426E-40dd-AFC4-6F175D3DCCD1}">
-              <a14:hiddenFill xmlns="" xmlns:a14="http://schemas.microsoft.com/office/drawing/2010/main">
+              <a14:hiddenFill xmlns:a14="http://schemas.microsoft.com/office/drawing/2010/main" xmlns="">
                 <a:solidFill>
                   <a:srgbClr val="FFFFFF"/>
                 </a:solidFill>
               </a14:hiddenFill>
             </a:ext>
             <a:ext uri="{91240B29-F687-4f45-9708-019B960494DF}">
-              <a14:hiddenLine xmlns="" xmlns:a14="http://schemas.microsoft.com/office/drawing/2010/main" w="12700">
+              <a14:hiddenLine xmlns:a14="http://schemas.microsoft.com/office/drawing/2010/main" xmlns="" w="12700">
                 <a:solidFill>
                   <a:srgbClr val="000000"/>
                 </a:solidFill>
@@ -3755,7 +3840,7 @@
               </a14:hiddenLine>
             </a:ext>
             <a:ext uri="{AF507438-7753-43e0-B8FC-AC1667EBCBE1}">
-              <a14:hiddenEffects xmlns="" xmlns:a14="http://schemas.microsoft.com/office/drawing/2010/main">
+              <a14:hiddenEffects xmlns:a14="http://schemas.microsoft.com/office/drawing/2010/main" xmlns="">
                 <a:effectLst>
                   <a:outerShdw blurRad="63500" dist="38099" dir="2700000" algn="ctr" rotWithShape="0">
                     <a:srgbClr val="000000">
@@ -3916,14 +4001,14 @@
           </a:ln>
           <a:extLst>
             <a:ext uri="{909E8E84-426E-40dd-AFC4-6F175D3DCCD1}">
-              <a14:hiddenFill xmlns="" xmlns:a14="http://schemas.microsoft.com/office/drawing/2010/main">
+              <a14:hiddenFill xmlns:a14="http://schemas.microsoft.com/office/drawing/2010/main" xmlns="">
                 <a:solidFill>
                   <a:srgbClr val="FFFFFF"/>
                 </a:solidFill>
               </a14:hiddenFill>
             </a:ext>
             <a:ext uri="{91240B29-F687-4f45-9708-019B960494DF}">
-              <a14:hiddenLine xmlns="" xmlns:a14="http://schemas.microsoft.com/office/drawing/2010/main" w="9525">
+              <a14:hiddenLine xmlns:a14="http://schemas.microsoft.com/office/drawing/2010/main" xmlns="" w="9525">
                 <a:solidFill>
                   <a:srgbClr val="000000"/>
                 </a:solidFill>
@@ -4250,14 +4335,14 @@
           <a:effectLst/>
           <a:extLst>
             <a:ext uri="{909E8E84-426E-40dd-AFC4-6F175D3DCCD1}">
-              <a14:hiddenFill xmlns="" xmlns:a14="http://schemas.microsoft.com/office/drawing/2010/main">
+              <a14:hiddenFill xmlns:a14="http://schemas.microsoft.com/office/drawing/2010/main" xmlns="">
                 <a:solidFill>
                   <a:srgbClr val="FFFFFF"/>
                 </a:solidFill>
               </a14:hiddenFill>
             </a:ext>
             <a:ext uri="{91240B29-F687-4f45-9708-019B960494DF}">
-              <a14:hiddenLine xmlns="" xmlns:a14="http://schemas.microsoft.com/office/drawing/2010/main" w="12700">
+              <a14:hiddenLine xmlns:a14="http://schemas.microsoft.com/office/drawing/2010/main" xmlns="" w="12700">
                 <a:solidFill>
                   <a:srgbClr val="000000"/>
                 </a:solidFill>
@@ -4267,7 +4352,7 @@
               </a14:hiddenLine>
             </a:ext>
             <a:ext uri="{AF507438-7753-43e0-B8FC-AC1667EBCBE1}">
-              <a14:hiddenEffects xmlns="" xmlns:a14="http://schemas.microsoft.com/office/drawing/2010/main">
+              <a14:hiddenEffects xmlns:a14="http://schemas.microsoft.com/office/drawing/2010/main" xmlns="">
                 <a:effectLst>
                   <a:outerShdw blurRad="63500" dist="38099" dir="2700000" algn="ctr" rotWithShape="0">
                     <a:srgbClr val="000000">
@@ -4498,14 +4583,14 @@
           </a:ln>
           <a:extLst>
             <a:ext uri="{909E8E84-426E-40dd-AFC4-6F175D3DCCD1}">
-              <a14:hiddenFill xmlns="" xmlns:a14="http://schemas.microsoft.com/office/drawing/2010/main">
+              <a14:hiddenFill xmlns:a14="http://schemas.microsoft.com/office/drawing/2010/main" xmlns="">
                 <a:solidFill>
                   <a:srgbClr val="FFFFFF"/>
                 </a:solidFill>
               </a14:hiddenFill>
             </a:ext>
             <a:ext uri="{91240B29-F687-4f45-9708-019B960494DF}">
-              <a14:hiddenLine xmlns="" xmlns:a14="http://schemas.microsoft.com/office/drawing/2010/main" w="9525">
+              <a14:hiddenLine xmlns:a14="http://schemas.microsoft.com/office/drawing/2010/main" xmlns="" w="9525">
                 <a:solidFill>
                   <a:srgbClr val="000000"/>
                 </a:solidFill>
@@ -4832,14 +4917,14 @@
           <a:effectLst/>
           <a:extLst>
             <a:ext uri="{909E8E84-426E-40dd-AFC4-6F175D3DCCD1}">
-              <a14:hiddenFill xmlns="" xmlns:a14="http://schemas.microsoft.com/office/drawing/2010/main">
+              <a14:hiddenFill xmlns:a14="http://schemas.microsoft.com/office/drawing/2010/main" xmlns="">
                 <a:solidFill>
                   <a:srgbClr val="FFFFFF"/>
                 </a:solidFill>
               </a14:hiddenFill>
             </a:ext>
             <a:ext uri="{91240B29-F687-4f45-9708-019B960494DF}">
-              <a14:hiddenLine xmlns="" xmlns:a14="http://schemas.microsoft.com/office/drawing/2010/main" w="12700">
+              <a14:hiddenLine xmlns:a14="http://schemas.microsoft.com/office/drawing/2010/main" xmlns="" w="12700">
                 <a:solidFill>
                   <a:srgbClr val="000000"/>
                 </a:solidFill>
@@ -4849,7 +4934,7 @@
               </a14:hiddenLine>
             </a:ext>
             <a:ext uri="{AF507438-7753-43e0-B8FC-AC1667EBCBE1}">
-              <a14:hiddenEffects xmlns="" xmlns:a14="http://schemas.microsoft.com/office/drawing/2010/main">
+              <a14:hiddenEffects xmlns:a14="http://schemas.microsoft.com/office/drawing/2010/main" xmlns="">
                 <a:effectLst>
                   <a:outerShdw blurRad="63500" dist="38099" dir="2700000" algn="ctr" rotWithShape="0">
                     <a:srgbClr val="000000">
@@ -5290,14 +5375,14 @@
           </a:ln>
           <a:extLst>
             <a:ext uri="{909E8E84-426E-40dd-AFC4-6F175D3DCCD1}">
-              <a14:hiddenFill xmlns="" xmlns:a14="http://schemas.microsoft.com/office/drawing/2010/main">
+              <a14:hiddenFill xmlns:a14="http://schemas.microsoft.com/office/drawing/2010/main" xmlns="">
                 <a:solidFill>
                   <a:srgbClr val="FFFFFF"/>
                 </a:solidFill>
               </a14:hiddenFill>
             </a:ext>
             <a:ext uri="{91240B29-F687-4f45-9708-019B960494DF}">
-              <a14:hiddenLine xmlns="" xmlns:a14="http://schemas.microsoft.com/office/drawing/2010/main" w="9525">
+              <a14:hiddenLine xmlns:a14="http://schemas.microsoft.com/office/drawing/2010/main" xmlns="" w="9525">
                 <a:solidFill>
                   <a:srgbClr val="000000"/>
                 </a:solidFill>
@@ -5624,14 +5709,14 @@
           <a:effectLst/>
           <a:extLst>
             <a:ext uri="{909E8E84-426E-40dd-AFC4-6F175D3DCCD1}">
-              <a14:hiddenFill xmlns="" xmlns:a14="http://schemas.microsoft.com/office/drawing/2010/main">
+              <a14:hiddenFill xmlns:a14="http://schemas.microsoft.com/office/drawing/2010/main" xmlns="">
                 <a:solidFill>
                   <a:srgbClr val="FFFFFF"/>
                 </a:solidFill>
               </a14:hiddenFill>
             </a:ext>
             <a:ext uri="{91240B29-F687-4f45-9708-019B960494DF}">
-              <a14:hiddenLine xmlns="" xmlns:a14="http://schemas.microsoft.com/office/drawing/2010/main" w="12700">
+              <a14:hiddenLine xmlns:a14="http://schemas.microsoft.com/office/drawing/2010/main" xmlns="" w="12700">
                 <a:solidFill>
                   <a:srgbClr val="000000"/>
                 </a:solidFill>
@@ -5641,7 +5726,7 @@
               </a14:hiddenLine>
             </a:ext>
             <a:ext uri="{AF507438-7753-43e0-B8FC-AC1667EBCBE1}">
-              <a14:hiddenEffects xmlns="" xmlns:a14="http://schemas.microsoft.com/office/drawing/2010/main">
+              <a14:hiddenEffects xmlns:a14="http://schemas.microsoft.com/office/drawing/2010/main" xmlns="">
                 <a:effectLst>
                   <a:outerShdw blurRad="63500" dist="38099" dir="2700000" algn="ctr" rotWithShape="0">
                     <a:srgbClr val="000000">
@@ -6113,14 +6198,14 @@
           </a:ln>
           <a:extLst>
             <a:ext uri="{909E8E84-426E-40dd-AFC4-6F175D3DCCD1}">
-              <a14:hiddenFill xmlns="" xmlns:a14="http://schemas.microsoft.com/office/drawing/2010/main">
+              <a14:hiddenFill xmlns:a14="http://schemas.microsoft.com/office/drawing/2010/main" xmlns="">
                 <a:solidFill>
                   <a:srgbClr val="FFFFFF"/>
                 </a:solidFill>
               </a14:hiddenFill>
             </a:ext>
             <a:ext uri="{91240B29-F687-4f45-9708-019B960494DF}">
-              <a14:hiddenLine xmlns="" xmlns:a14="http://schemas.microsoft.com/office/drawing/2010/main" w="9525">
+              <a14:hiddenLine xmlns:a14="http://schemas.microsoft.com/office/drawing/2010/main" xmlns="" w="9525">
                 <a:solidFill>
                   <a:srgbClr val="000000"/>
                 </a:solidFill>
@@ -6447,14 +6532,14 @@
           <a:effectLst/>
           <a:extLst>
             <a:ext uri="{909E8E84-426E-40dd-AFC4-6F175D3DCCD1}">
-              <a14:hiddenFill xmlns="" xmlns:a14="http://schemas.microsoft.com/office/drawing/2010/main">
+              <a14:hiddenFill xmlns:a14="http://schemas.microsoft.com/office/drawing/2010/main" xmlns="">
                 <a:solidFill>
                   <a:srgbClr val="FFFFFF"/>
                 </a:solidFill>
               </a14:hiddenFill>
             </a:ext>
             <a:ext uri="{91240B29-F687-4f45-9708-019B960494DF}">
-              <a14:hiddenLine xmlns="" xmlns:a14="http://schemas.microsoft.com/office/drawing/2010/main" w="12700">
+              <a14:hiddenLine xmlns:a14="http://schemas.microsoft.com/office/drawing/2010/main" xmlns="" w="12700">
                 <a:solidFill>
                   <a:srgbClr val="000000"/>
                 </a:solidFill>
@@ -6464,7 +6549,7 @@
               </a14:hiddenLine>
             </a:ext>
             <a:ext uri="{AF507438-7753-43e0-B8FC-AC1667EBCBE1}">
-              <a14:hiddenEffects xmlns="" xmlns:a14="http://schemas.microsoft.com/office/drawing/2010/main">
+              <a14:hiddenEffects xmlns:a14="http://schemas.microsoft.com/office/drawing/2010/main" xmlns="">
                 <a:effectLst>
                   <a:outerShdw blurRad="63500" dist="38099" dir="2700000" algn="ctr" rotWithShape="0">
                     <a:srgbClr val="000000">
@@ -7185,14 +7270,14 @@
           </a:ln>
           <a:extLst>
             <a:ext uri="{909E8E84-426E-40dd-AFC4-6F175D3DCCD1}">
-              <a14:hiddenFill xmlns="" xmlns:a14="http://schemas.microsoft.com/office/drawing/2010/main">
+              <a14:hiddenFill xmlns:a14="http://schemas.microsoft.com/office/drawing/2010/main" xmlns="">
                 <a:solidFill>
                   <a:srgbClr val="FFFFFF"/>
                 </a:solidFill>
               </a14:hiddenFill>
             </a:ext>
             <a:ext uri="{91240B29-F687-4f45-9708-019B960494DF}">
-              <a14:hiddenLine xmlns="" xmlns:a14="http://schemas.microsoft.com/office/drawing/2010/main" w="9525">
+              <a14:hiddenLine xmlns:a14="http://schemas.microsoft.com/office/drawing/2010/main" xmlns="" w="9525">
                 <a:solidFill>
                   <a:srgbClr val="000000"/>
                 </a:solidFill>
@@ -7519,14 +7604,14 @@
           <a:effectLst/>
           <a:extLst>
             <a:ext uri="{909E8E84-426E-40dd-AFC4-6F175D3DCCD1}">
-              <a14:hiddenFill xmlns="" xmlns:a14="http://schemas.microsoft.com/office/drawing/2010/main">
+              <a14:hiddenFill xmlns:a14="http://schemas.microsoft.com/office/drawing/2010/main" xmlns="">
                 <a:solidFill>
                   <a:srgbClr val="FFFFFF"/>
                 </a:solidFill>
               </a14:hiddenFill>
             </a:ext>
             <a:ext uri="{91240B29-F687-4f45-9708-019B960494DF}">
-              <a14:hiddenLine xmlns="" xmlns:a14="http://schemas.microsoft.com/office/drawing/2010/main" w="12700">
+              <a14:hiddenLine xmlns:a14="http://schemas.microsoft.com/office/drawing/2010/main" xmlns="" w="12700">
                 <a:solidFill>
                   <a:srgbClr val="000000"/>
                 </a:solidFill>
@@ -7536,7 +7621,7 @@
               </a14:hiddenLine>
             </a:ext>
             <a:ext uri="{AF507438-7753-43e0-B8FC-AC1667EBCBE1}">
-              <a14:hiddenEffects xmlns="" xmlns:a14="http://schemas.microsoft.com/office/drawing/2010/main">
+              <a14:hiddenEffects xmlns:a14="http://schemas.microsoft.com/office/drawing/2010/main" xmlns="">
                 <a:effectLst>
                   <a:outerShdw blurRad="63500" dist="38099" dir="2700000" algn="ctr" rotWithShape="0">
                     <a:srgbClr val="000000">
@@ -7788,14 +7873,14 @@
           </a:ln>
           <a:extLst>
             <a:ext uri="{909E8E84-426E-40dd-AFC4-6F175D3DCCD1}">
-              <a14:hiddenFill xmlns="" xmlns:a14="http://schemas.microsoft.com/office/drawing/2010/main">
+              <a14:hiddenFill xmlns:a14="http://schemas.microsoft.com/office/drawing/2010/main" xmlns="">
                 <a:solidFill>
                   <a:srgbClr val="FFFFFF"/>
                 </a:solidFill>
               </a14:hiddenFill>
             </a:ext>
             <a:ext uri="{91240B29-F687-4f45-9708-019B960494DF}">
-              <a14:hiddenLine xmlns="" xmlns:a14="http://schemas.microsoft.com/office/drawing/2010/main" w="9525">
+              <a14:hiddenLine xmlns:a14="http://schemas.microsoft.com/office/drawing/2010/main" xmlns="" w="9525">
                 <a:solidFill>
                   <a:srgbClr val="000000"/>
                 </a:solidFill>
@@ -8122,14 +8207,14 @@
           <a:effectLst/>
           <a:extLst>
             <a:ext uri="{909E8E84-426E-40dd-AFC4-6F175D3DCCD1}">
-              <a14:hiddenFill xmlns="" xmlns:a14="http://schemas.microsoft.com/office/drawing/2010/main">
+              <a14:hiddenFill xmlns:a14="http://schemas.microsoft.com/office/drawing/2010/main" xmlns="">
                 <a:solidFill>
                   <a:srgbClr val="FFFFFF"/>
                 </a:solidFill>
               </a14:hiddenFill>
             </a:ext>
             <a:ext uri="{91240B29-F687-4f45-9708-019B960494DF}">
-              <a14:hiddenLine xmlns="" xmlns:a14="http://schemas.microsoft.com/office/drawing/2010/main" w="12700">
+              <a14:hiddenLine xmlns:a14="http://schemas.microsoft.com/office/drawing/2010/main" xmlns="" w="12700">
                 <a:solidFill>
                   <a:srgbClr val="000000"/>
                 </a:solidFill>
@@ -8139,7 +8224,7 @@
               </a14:hiddenLine>
             </a:ext>
             <a:ext uri="{AF507438-7753-43e0-B8FC-AC1667EBCBE1}">
-              <a14:hiddenEffects xmlns="" xmlns:a14="http://schemas.microsoft.com/office/drawing/2010/main">
+              <a14:hiddenEffects xmlns:a14="http://schemas.microsoft.com/office/drawing/2010/main" xmlns="">
                 <a:effectLst>
                   <a:outerShdw blurRad="63500" dist="38099" dir="2700000" algn="ctr" rotWithShape="0">
                     <a:srgbClr val="000000">
@@ -8880,14 +8965,14 @@
           </a:ln>
           <a:extLst>
             <a:ext uri="{909E8E84-426E-40dd-AFC4-6F175D3DCCD1}">
-              <a14:hiddenFill xmlns="" xmlns:a14="http://schemas.microsoft.com/office/drawing/2010/main">
+              <a14:hiddenFill xmlns:a14="http://schemas.microsoft.com/office/drawing/2010/main" xmlns="">
                 <a:solidFill>
                   <a:srgbClr val="FFFFFF"/>
                 </a:solidFill>
               </a14:hiddenFill>
             </a:ext>
             <a:ext uri="{91240B29-F687-4f45-9708-019B960494DF}">
-              <a14:hiddenLine xmlns="" xmlns:a14="http://schemas.microsoft.com/office/drawing/2010/main" w="9525">
+              <a14:hiddenLine xmlns:a14="http://schemas.microsoft.com/office/drawing/2010/main" xmlns="" w="9525">
                 <a:solidFill>
                   <a:srgbClr val="000000"/>
                 </a:solidFill>
@@ -9131,14 +9216,14 @@
           <a:effectLst/>
           <a:extLst>
             <a:ext uri="{909E8E84-426E-40dd-AFC4-6F175D3DCCD1}">
-              <a14:hiddenFill xmlns="" xmlns:a14="http://schemas.microsoft.com/office/drawing/2010/main">
+              <a14:hiddenFill xmlns:a14="http://schemas.microsoft.com/office/drawing/2010/main" xmlns="">
                 <a:solidFill>
                   <a:srgbClr val="FFFFFF"/>
                 </a:solidFill>
               </a14:hiddenFill>
             </a:ext>
             <a:ext uri="{91240B29-F687-4f45-9708-019B960494DF}">
-              <a14:hiddenLine xmlns="" xmlns:a14="http://schemas.microsoft.com/office/drawing/2010/main" w="12700">
+              <a14:hiddenLine xmlns:a14="http://schemas.microsoft.com/office/drawing/2010/main" xmlns="" w="12700">
                 <a:solidFill>
                   <a:srgbClr val="000000"/>
                 </a:solidFill>
@@ -9148,7 +9233,7 @@
               </a14:hiddenLine>
             </a:ext>
             <a:ext uri="{AF507438-7753-43e0-B8FC-AC1667EBCBE1}">
-              <a14:hiddenEffects xmlns="" xmlns:a14="http://schemas.microsoft.com/office/drawing/2010/main">
+              <a14:hiddenEffects xmlns:a14="http://schemas.microsoft.com/office/drawing/2010/main" xmlns="">
                 <a:effectLst>
                   <a:outerShdw blurRad="63500" dist="38099" dir="2700000" algn="ctr" rotWithShape="0">
                     <a:srgbClr val="000000">
@@ -9402,14 +9487,14 @@
           </a:ln>
           <a:extLst>
             <a:ext uri="{909E8E84-426E-40dd-AFC4-6F175D3DCCD1}">
-              <a14:hiddenFill xmlns="" xmlns:a14="http://schemas.microsoft.com/office/drawing/2010/main">
+              <a14:hiddenFill xmlns:a14="http://schemas.microsoft.com/office/drawing/2010/main" xmlns="">
                 <a:solidFill>
                   <a:srgbClr val="FFFFFF"/>
                 </a:solidFill>
               </a14:hiddenFill>
             </a:ext>
             <a:ext uri="{91240B29-F687-4f45-9708-019B960494DF}">
-              <a14:hiddenLine xmlns="" xmlns:a14="http://schemas.microsoft.com/office/drawing/2010/main" w="9525">
+              <a14:hiddenLine xmlns:a14="http://schemas.microsoft.com/office/drawing/2010/main" xmlns="" w="9525">
                 <a:solidFill>
                   <a:srgbClr val="000000"/>
                 </a:solidFill>
@@ -9736,14 +9821,14 @@
           <a:effectLst/>
           <a:extLst>
             <a:ext uri="{909E8E84-426E-40dd-AFC4-6F175D3DCCD1}">
-              <a14:hiddenFill xmlns="" xmlns:a14="http://schemas.microsoft.com/office/drawing/2010/main">
+              <a14:hiddenFill xmlns:a14="http://schemas.microsoft.com/office/drawing/2010/main" xmlns="">
                 <a:solidFill>
                   <a:srgbClr val="FFFFFF"/>
                 </a:solidFill>
               </a14:hiddenFill>
             </a:ext>
             <a:ext uri="{91240B29-F687-4f45-9708-019B960494DF}">
-              <a14:hiddenLine xmlns="" xmlns:a14="http://schemas.microsoft.com/office/drawing/2010/main" w="12700">
+              <a14:hiddenLine xmlns:a14="http://schemas.microsoft.com/office/drawing/2010/main" xmlns="" w="12700">
                 <a:solidFill>
                   <a:srgbClr val="000000"/>
                 </a:solidFill>
@@ -9753,7 +9838,7 @@
               </a14:hiddenLine>
             </a:ext>
             <a:ext uri="{AF507438-7753-43e0-B8FC-AC1667EBCBE1}">
-              <a14:hiddenEffects xmlns="" xmlns:a14="http://schemas.microsoft.com/office/drawing/2010/main">
+              <a14:hiddenEffects xmlns:a14="http://schemas.microsoft.com/office/drawing/2010/main" xmlns="">
                 <a:effectLst>
                   <a:outerShdw blurRad="63500" dist="38099" dir="2700000" algn="ctr" rotWithShape="0">
                     <a:srgbClr val="000000">
@@ -10432,14 +10517,14 @@
           </a:ln>
           <a:extLst>
             <a:ext uri="{909E8E84-426E-40dd-AFC4-6F175D3DCCD1}">
-              <a14:hiddenFill xmlns="" xmlns:a14="http://schemas.microsoft.com/office/drawing/2010/main">
+              <a14:hiddenFill xmlns:a14="http://schemas.microsoft.com/office/drawing/2010/main" xmlns="">
                 <a:solidFill>
                   <a:srgbClr val="FFFFFF"/>
                 </a:solidFill>
               </a14:hiddenFill>
             </a:ext>
             <a:ext uri="{91240B29-F687-4f45-9708-019B960494DF}">
-              <a14:hiddenLine xmlns="" xmlns:a14="http://schemas.microsoft.com/office/drawing/2010/main" w="9525">
+              <a14:hiddenLine xmlns:a14="http://schemas.microsoft.com/office/drawing/2010/main" xmlns="" w="9525">
                 <a:solidFill>
                   <a:srgbClr val="000000"/>
                 </a:solidFill>
@@ -10766,14 +10851,14 @@
           <a:effectLst/>
           <a:extLst>
             <a:ext uri="{909E8E84-426E-40dd-AFC4-6F175D3DCCD1}">
-              <a14:hiddenFill xmlns="" xmlns:a14="http://schemas.microsoft.com/office/drawing/2010/main">
+              <a14:hiddenFill xmlns:a14="http://schemas.microsoft.com/office/drawing/2010/main" xmlns="">
                 <a:solidFill>
                   <a:srgbClr val="FFFFFF"/>
                 </a:solidFill>
               </a14:hiddenFill>
             </a:ext>
             <a:ext uri="{91240B29-F687-4f45-9708-019B960494DF}">
-              <a14:hiddenLine xmlns="" xmlns:a14="http://schemas.microsoft.com/office/drawing/2010/main" w="12700">
+              <a14:hiddenLine xmlns:a14="http://schemas.microsoft.com/office/drawing/2010/main" xmlns="" w="12700">
                 <a:solidFill>
                   <a:srgbClr val="000000"/>
                 </a:solidFill>
@@ -10783,7 +10868,7 @@
               </a14:hiddenLine>
             </a:ext>
             <a:ext uri="{AF507438-7753-43e0-B8FC-AC1667EBCBE1}">
-              <a14:hiddenEffects xmlns="" xmlns:a14="http://schemas.microsoft.com/office/drawing/2010/main">
+              <a14:hiddenEffects xmlns:a14="http://schemas.microsoft.com/office/drawing/2010/main" xmlns="">
                 <a:effectLst>
                   <a:outerShdw blurRad="63500" dist="38099" dir="2700000" algn="ctr" rotWithShape="0">
                     <a:srgbClr val="000000">
@@ -11587,14 +11672,14 @@
           </a:ln>
           <a:extLst>
             <a:ext uri="{909E8E84-426E-40dd-AFC4-6F175D3DCCD1}">
-              <a14:hiddenFill xmlns="" xmlns:a14="http://schemas.microsoft.com/office/drawing/2010/main">
+              <a14:hiddenFill xmlns:a14="http://schemas.microsoft.com/office/drawing/2010/main" xmlns="">
                 <a:solidFill>
                   <a:srgbClr val="FFFFFF"/>
                 </a:solidFill>
               </a14:hiddenFill>
             </a:ext>
             <a:ext uri="{91240B29-F687-4f45-9708-019B960494DF}">
-              <a14:hiddenLine xmlns="" xmlns:a14="http://schemas.microsoft.com/office/drawing/2010/main" w="9525">
+              <a14:hiddenLine xmlns:a14="http://schemas.microsoft.com/office/drawing/2010/main" xmlns="" w="9525">
                 <a:solidFill>
                   <a:srgbClr val="000000"/>
                 </a:solidFill>
@@ -11921,14 +12006,14 @@
           <a:effectLst/>
           <a:extLst>
             <a:ext uri="{909E8E84-426E-40dd-AFC4-6F175D3DCCD1}">
-              <a14:hiddenFill xmlns="" xmlns:a14="http://schemas.microsoft.com/office/drawing/2010/main">
+              <a14:hiddenFill xmlns:a14="http://schemas.microsoft.com/office/drawing/2010/main" xmlns="">
                 <a:solidFill>
                   <a:srgbClr val="FFFFFF"/>
                 </a:solidFill>
               </a14:hiddenFill>
             </a:ext>
             <a:ext uri="{91240B29-F687-4f45-9708-019B960494DF}">
-              <a14:hiddenLine xmlns="" xmlns:a14="http://schemas.microsoft.com/office/drawing/2010/main" w="12700">
+              <a14:hiddenLine xmlns:a14="http://schemas.microsoft.com/office/drawing/2010/main" xmlns="" w="12700">
                 <a:solidFill>
                   <a:srgbClr val="000000"/>
                 </a:solidFill>
@@ -11938,7 +12023,7 @@
               </a14:hiddenLine>
             </a:ext>
             <a:ext uri="{AF507438-7753-43e0-B8FC-AC1667EBCBE1}">
-              <a14:hiddenEffects xmlns="" xmlns:a14="http://schemas.microsoft.com/office/drawing/2010/main">
+              <a14:hiddenEffects xmlns:a14="http://schemas.microsoft.com/office/drawing/2010/main" xmlns="">
                 <a:effectLst>
                   <a:outerShdw blurRad="63500" dist="38099" dir="2700000" algn="ctr" rotWithShape="0">
                     <a:srgbClr val="000000">
@@ -12698,14 +12783,14 @@
           </a:ln>
           <a:extLst>
             <a:ext uri="{909E8E84-426E-40dd-AFC4-6F175D3DCCD1}">
-              <a14:hiddenFill xmlns="" xmlns:a14="http://schemas.microsoft.com/office/drawing/2010/main">
+              <a14:hiddenFill xmlns:a14="http://schemas.microsoft.com/office/drawing/2010/main" xmlns="">
                 <a:solidFill>
                   <a:srgbClr val="FFFFFF"/>
                 </a:solidFill>
               </a14:hiddenFill>
             </a:ext>
             <a:ext uri="{91240B29-F687-4f45-9708-019B960494DF}">
-              <a14:hiddenLine xmlns="" xmlns:a14="http://schemas.microsoft.com/office/drawing/2010/main" w="9525">
+              <a14:hiddenLine xmlns:a14="http://schemas.microsoft.com/office/drawing/2010/main" xmlns="" w="9525">
                 <a:solidFill>
                   <a:srgbClr val="000000"/>
                 </a:solidFill>
@@ -13032,14 +13117,14 @@
           <a:effectLst/>
           <a:extLst>
             <a:ext uri="{909E8E84-426E-40dd-AFC4-6F175D3DCCD1}">
-              <a14:hiddenFill xmlns="" xmlns:a14="http://schemas.microsoft.com/office/drawing/2010/main">
+              <a14:hiddenFill xmlns:a14="http://schemas.microsoft.com/office/drawing/2010/main" xmlns="">
                 <a:solidFill>
                   <a:srgbClr val="FFFFFF"/>
                 </a:solidFill>
               </a14:hiddenFill>
             </a:ext>
             <a:ext uri="{91240B29-F687-4f45-9708-019B960494DF}">
-              <a14:hiddenLine xmlns="" xmlns:a14="http://schemas.microsoft.com/office/drawing/2010/main" w="12700">
+              <a14:hiddenLine xmlns:a14="http://schemas.microsoft.com/office/drawing/2010/main" xmlns="" w="12700">
                 <a:solidFill>
                   <a:srgbClr val="000000"/>
                 </a:solidFill>
@@ -13049,7 +13134,7 @@
               </a14:hiddenLine>
             </a:ext>
             <a:ext uri="{AF507438-7753-43e0-B8FC-AC1667EBCBE1}">
-              <a14:hiddenEffects xmlns="" xmlns:a14="http://schemas.microsoft.com/office/drawing/2010/main">
+              <a14:hiddenEffects xmlns:a14="http://schemas.microsoft.com/office/drawing/2010/main" xmlns="">
                 <a:effectLst>
                   <a:outerShdw blurRad="63500" dist="38099" dir="2700000" algn="ctr" rotWithShape="0">
                     <a:srgbClr val="000000">
@@ -13809,14 +13894,14 @@
           </a:ln>
           <a:extLst>
             <a:ext uri="{909E8E84-426E-40dd-AFC4-6F175D3DCCD1}">
-              <a14:hiddenFill xmlns="" xmlns:a14="http://schemas.microsoft.com/office/drawing/2010/main">
+              <a14:hiddenFill xmlns:a14="http://schemas.microsoft.com/office/drawing/2010/main" xmlns="">
                 <a:solidFill>
                   <a:srgbClr val="FFFFFF"/>
                 </a:solidFill>
               </a14:hiddenFill>
             </a:ext>
             <a:ext uri="{91240B29-F687-4f45-9708-019B960494DF}">
-              <a14:hiddenLine xmlns="" xmlns:a14="http://schemas.microsoft.com/office/drawing/2010/main" w="9525">
+              <a14:hiddenLine xmlns:a14="http://schemas.microsoft.com/office/drawing/2010/main" xmlns="" w="9525">
                 <a:solidFill>
                   <a:srgbClr val="000000"/>
                 </a:solidFill>
@@ -14143,14 +14228,14 @@
           <a:effectLst/>
           <a:extLst>
             <a:ext uri="{909E8E84-426E-40dd-AFC4-6F175D3DCCD1}">
-              <a14:hiddenFill xmlns="" xmlns:a14="http://schemas.microsoft.com/office/drawing/2010/main">
+              <a14:hiddenFill xmlns:a14="http://schemas.microsoft.com/office/drawing/2010/main" xmlns="">
                 <a:solidFill>
                   <a:srgbClr val="FFFFFF"/>
                 </a:solidFill>
               </a14:hiddenFill>
             </a:ext>
             <a:ext uri="{91240B29-F687-4f45-9708-019B960494DF}">
-              <a14:hiddenLine xmlns="" xmlns:a14="http://schemas.microsoft.com/office/drawing/2010/main" w="12700">
+              <a14:hiddenLine xmlns:a14="http://schemas.microsoft.com/office/drawing/2010/main" xmlns="" w="12700">
                 <a:solidFill>
                   <a:srgbClr val="000000"/>
                 </a:solidFill>
@@ -14160,7 +14245,7 @@
               </a14:hiddenLine>
             </a:ext>
             <a:ext uri="{AF507438-7753-43e0-B8FC-AC1667EBCBE1}">
-              <a14:hiddenEffects xmlns="" xmlns:a14="http://schemas.microsoft.com/office/drawing/2010/main">
+              <a14:hiddenEffects xmlns:a14="http://schemas.microsoft.com/office/drawing/2010/main" xmlns="">
                 <a:effectLst>
                   <a:outerShdw blurRad="63500" dist="38099" dir="2700000" algn="ctr" rotWithShape="0">
                     <a:srgbClr val="000000">
@@ -14461,14 +14546,14 @@
           </a:ln>
           <a:extLst>
             <a:ext uri="{909E8E84-426E-40dd-AFC4-6F175D3DCCD1}">
-              <a14:hiddenFill xmlns="" xmlns:a14="http://schemas.microsoft.com/office/drawing/2010/main">
+              <a14:hiddenFill xmlns:a14="http://schemas.microsoft.com/office/drawing/2010/main" xmlns="">
                 <a:solidFill>
                   <a:srgbClr val="FFFFFF"/>
                 </a:solidFill>
               </a14:hiddenFill>
             </a:ext>
             <a:ext uri="{91240B29-F687-4f45-9708-019B960494DF}">
-              <a14:hiddenLine xmlns="" xmlns:a14="http://schemas.microsoft.com/office/drawing/2010/main" w="9525">
+              <a14:hiddenLine xmlns:a14="http://schemas.microsoft.com/office/drawing/2010/main" xmlns="" w="9525">
                 <a:solidFill>
                   <a:srgbClr val="000000"/>
                 </a:solidFill>
@@ -14795,14 +14880,14 @@
           <a:effectLst/>
           <a:extLst>
             <a:ext uri="{909E8E84-426E-40dd-AFC4-6F175D3DCCD1}">
-              <a14:hiddenFill xmlns="" xmlns:a14="http://schemas.microsoft.com/office/drawing/2010/main">
+              <a14:hiddenFill xmlns:a14="http://schemas.microsoft.com/office/drawing/2010/main" xmlns="">
                 <a:solidFill>
                   <a:srgbClr val="FFFFFF"/>
                 </a:solidFill>
               </a14:hiddenFill>
             </a:ext>
             <a:ext uri="{91240B29-F687-4f45-9708-019B960494DF}">
-              <a14:hiddenLine xmlns="" xmlns:a14="http://schemas.microsoft.com/office/drawing/2010/main" w="12700">
+              <a14:hiddenLine xmlns:a14="http://schemas.microsoft.com/office/drawing/2010/main" xmlns="" w="12700">
                 <a:solidFill>
                   <a:srgbClr val="000000"/>
                 </a:solidFill>
@@ -14812,7 +14897,7 @@
               </a14:hiddenLine>
             </a:ext>
             <a:ext uri="{AF507438-7753-43e0-B8FC-AC1667EBCBE1}">
-              <a14:hiddenEffects xmlns="" xmlns:a14="http://schemas.microsoft.com/office/drawing/2010/main">
+              <a14:hiddenEffects xmlns:a14="http://schemas.microsoft.com/office/drawing/2010/main" xmlns="">
                 <a:effectLst>
                   <a:outerShdw blurRad="63500" dist="38099" dir="2700000" algn="ctr" rotWithShape="0">
                     <a:srgbClr val="000000">
@@ -15043,14 +15128,14 @@
           </a:ln>
           <a:extLst>
             <a:ext uri="{909E8E84-426E-40dd-AFC4-6F175D3DCCD1}">
-              <a14:hiddenFill xmlns="" xmlns:a14="http://schemas.microsoft.com/office/drawing/2010/main">
+              <a14:hiddenFill xmlns:a14="http://schemas.microsoft.com/office/drawing/2010/main" xmlns="">
                 <a:solidFill>
                   <a:srgbClr val="FFFFFF"/>
                 </a:solidFill>
               </a14:hiddenFill>
             </a:ext>
             <a:ext uri="{91240B29-F687-4f45-9708-019B960494DF}">
-              <a14:hiddenLine xmlns="" xmlns:a14="http://schemas.microsoft.com/office/drawing/2010/main" w="9525">
+              <a14:hiddenLine xmlns:a14="http://schemas.microsoft.com/office/drawing/2010/main" xmlns="" w="9525">
                 <a:solidFill>
                   <a:srgbClr val="000000"/>
                 </a:solidFill>
@@ -15471,14 +15556,14 @@
           <a:effectLst/>
           <a:extLst>
             <a:ext uri="{909E8E84-426E-40dd-AFC4-6F175D3DCCD1}">
-              <a14:hiddenFill xmlns="" xmlns:a14="http://schemas.microsoft.com/office/drawing/2010/main">
+              <a14:hiddenFill xmlns:a14="http://schemas.microsoft.com/office/drawing/2010/main" xmlns="">
                 <a:solidFill>
                   <a:srgbClr val="FFFFFF"/>
                 </a:solidFill>
               </a14:hiddenFill>
             </a:ext>
             <a:ext uri="{91240B29-F687-4f45-9708-019B960494DF}">
-              <a14:hiddenLine xmlns="" xmlns:a14="http://schemas.microsoft.com/office/drawing/2010/main" w="12700">
+              <a14:hiddenLine xmlns:a14="http://schemas.microsoft.com/office/drawing/2010/main" xmlns="" w="12700">
                 <a:solidFill>
                   <a:srgbClr val="000000"/>
                 </a:solidFill>
@@ -15488,7 +15573,7 @@
               </a14:hiddenLine>
             </a:ext>
             <a:ext uri="{AF507438-7753-43e0-B8FC-AC1667EBCBE1}">
-              <a14:hiddenEffects xmlns="" xmlns:a14="http://schemas.microsoft.com/office/drawing/2010/main">
+              <a14:hiddenEffects xmlns:a14="http://schemas.microsoft.com/office/drawing/2010/main" xmlns="">
                 <a:effectLst>
                   <a:outerShdw blurRad="63500" dist="38099" dir="2700000" algn="ctr" rotWithShape="0">
                     <a:srgbClr val="000000">
@@ -16150,14 +16235,14 @@
           <a:effectLst/>
           <a:extLst>
             <a:ext uri="{909E8E84-426E-40dd-AFC4-6F175D3DCCD1}">
-              <a14:hiddenFill xmlns="" xmlns:a14="http://schemas.microsoft.com/office/drawing/2010/main">
+              <a14:hiddenFill xmlns:a14="http://schemas.microsoft.com/office/drawing/2010/main" xmlns="">
                 <a:solidFill>
                   <a:srgbClr val="FFFFFF"/>
                 </a:solidFill>
               </a14:hiddenFill>
             </a:ext>
             <a:ext uri="{91240B29-F687-4f45-9708-019B960494DF}">
-              <a14:hiddenLine xmlns="" xmlns:a14="http://schemas.microsoft.com/office/drawing/2010/main" w="12700">
+              <a14:hiddenLine xmlns:a14="http://schemas.microsoft.com/office/drawing/2010/main" xmlns="" w="12700">
                 <a:solidFill>
                   <a:srgbClr val="000000"/>
                 </a:solidFill>
@@ -16167,7 +16252,7 @@
               </a14:hiddenLine>
             </a:ext>
             <a:ext uri="{AF507438-7753-43e0-B8FC-AC1667EBCBE1}">
-              <a14:hiddenEffects xmlns="" xmlns:a14="http://schemas.microsoft.com/office/drawing/2010/main">
+              <a14:hiddenEffects xmlns:a14="http://schemas.microsoft.com/office/drawing/2010/main" xmlns="">
                 <a:effectLst>
                   <a:outerShdw blurRad="63500" dist="38099" dir="2700000" algn="ctr" rotWithShape="0">
                     <a:srgbClr val="000000">
@@ -16598,14 +16683,14 @@
           <a:effectLst/>
           <a:extLst>
             <a:ext uri="{909E8E84-426E-40dd-AFC4-6F175D3DCCD1}">
-              <a14:hiddenFill xmlns="" xmlns:a14="http://schemas.microsoft.com/office/drawing/2010/main">
+              <a14:hiddenFill xmlns:a14="http://schemas.microsoft.com/office/drawing/2010/main" xmlns="">
                 <a:solidFill>
                   <a:srgbClr val="FFFFFF"/>
                 </a:solidFill>
               </a14:hiddenFill>
             </a:ext>
             <a:ext uri="{91240B29-F687-4f45-9708-019B960494DF}">
-              <a14:hiddenLine xmlns="" xmlns:a14="http://schemas.microsoft.com/office/drawing/2010/main" w="12700">
+              <a14:hiddenLine xmlns:a14="http://schemas.microsoft.com/office/drawing/2010/main" xmlns="" w="12700">
                 <a:solidFill>
                   <a:srgbClr val="000000"/>
                 </a:solidFill>
@@ -16615,7 +16700,7 @@
               </a14:hiddenLine>
             </a:ext>
             <a:ext uri="{AF507438-7753-43e0-B8FC-AC1667EBCBE1}">
-              <a14:hiddenEffects xmlns="" xmlns:a14="http://schemas.microsoft.com/office/drawing/2010/main">
+              <a14:hiddenEffects xmlns:a14="http://schemas.microsoft.com/office/drawing/2010/main" xmlns="">
                 <a:effectLst>
                   <a:outerShdw blurRad="63500" dist="38099" dir="2700000" algn="ctr" rotWithShape="0">
                     <a:srgbClr val="000000">
@@ -16970,14 +17055,14 @@
           <a:effectLst/>
           <a:extLst>
             <a:ext uri="{909E8E84-426E-40dd-AFC4-6F175D3DCCD1}">
-              <a14:hiddenFill xmlns="" xmlns:a14="http://schemas.microsoft.com/office/drawing/2010/main">
+              <a14:hiddenFill xmlns:a14="http://schemas.microsoft.com/office/drawing/2010/main" xmlns="">
                 <a:solidFill>
                   <a:srgbClr val="FFFFFF"/>
                 </a:solidFill>
               </a14:hiddenFill>
             </a:ext>
             <a:ext uri="{91240B29-F687-4f45-9708-019B960494DF}">
-              <a14:hiddenLine xmlns="" xmlns:a14="http://schemas.microsoft.com/office/drawing/2010/main" w="12700">
+              <a14:hiddenLine xmlns:a14="http://schemas.microsoft.com/office/drawing/2010/main" xmlns="" w="12700">
                 <a:solidFill>
                   <a:srgbClr val="000000"/>
                 </a:solidFill>
@@ -16987,7 +17072,7 @@
               </a14:hiddenLine>
             </a:ext>
             <a:ext uri="{AF507438-7753-43e0-B8FC-AC1667EBCBE1}">
-              <a14:hiddenEffects xmlns="" xmlns:a14="http://schemas.microsoft.com/office/drawing/2010/main">
+              <a14:hiddenEffects xmlns:a14="http://schemas.microsoft.com/office/drawing/2010/main" xmlns="">
                 <a:effectLst>
                   <a:outerShdw blurRad="63500" dist="38099" dir="2700000" algn="ctr" rotWithShape="0">
                     <a:srgbClr val="000000">
@@ -17565,14 +17650,14 @@
           <a:effectLst/>
           <a:extLst>
             <a:ext uri="{909E8E84-426E-40dd-AFC4-6F175D3DCCD1}">
-              <a14:hiddenFill xmlns="" xmlns:a14="http://schemas.microsoft.com/office/drawing/2010/main">
+              <a14:hiddenFill xmlns:a14="http://schemas.microsoft.com/office/drawing/2010/main" xmlns="">
                 <a:solidFill>
                   <a:srgbClr val="FFFFFF"/>
                 </a:solidFill>
               </a14:hiddenFill>
             </a:ext>
             <a:ext uri="{91240B29-F687-4f45-9708-019B960494DF}">
-              <a14:hiddenLine xmlns="" xmlns:a14="http://schemas.microsoft.com/office/drawing/2010/main" w="12700">
+              <a14:hiddenLine xmlns:a14="http://schemas.microsoft.com/office/drawing/2010/main" xmlns="" w="12700">
                 <a:solidFill>
                   <a:srgbClr val="000000"/>
                 </a:solidFill>
@@ -17582,7 +17667,7 @@
               </a14:hiddenLine>
             </a:ext>
             <a:ext uri="{AF507438-7753-43e0-B8FC-AC1667EBCBE1}">
-              <a14:hiddenEffects xmlns="" xmlns:a14="http://schemas.microsoft.com/office/drawing/2010/main">
+              <a14:hiddenEffects xmlns:a14="http://schemas.microsoft.com/office/drawing/2010/main" xmlns="">
                 <a:effectLst>
                   <a:outerShdw blurRad="63500" dist="38099" dir="2700000" algn="ctr" rotWithShape="0">
                     <a:srgbClr val="000000">
@@ -18443,14 +18528,14 @@
           <a:effectLst/>
           <a:extLst>
             <a:ext uri="{909E8E84-426E-40dd-AFC4-6F175D3DCCD1}">
-              <a14:hiddenFill xmlns="" xmlns:a14="http://schemas.microsoft.com/office/drawing/2010/main">
+              <a14:hiddenFill xmlns:a14="http://schemas.microsoft.com/office/drawing/2010/main" xmlns="">
                 <a:solidFill>
                   <a:srgbClr val="FFFFFF"/>
                 </a:solidFill>
               </a14:hiddenFill>
             </a:ext>
             <a:ext uri="{91240B29-F687-4f45-9708-019B960494DF}">
-              <a14:hiddenLine xmlns="" xmlns:a14="http://schemas.microsoft.com/office/drawing/2010/main" w="12700">
+              <a14:hiddenLine xmlns:a14="http://schemas.microsoft.com/office/drawing/2010/main" xmlns="" w="12700">
                 <a:solidFill>
                   <a:srgbClr val="000000"/>
                 </a:solidFill>
@@ -18460,7 +18545,7 @@
               </a14:hiddenLine>
             </a:ext>
             <a:ext uri="{AF507438-7753-43e0-B8FC-AC1667EBCBE1}">
-              <a14:hiddenEffects xmlns="" xmlns:a14="http://schemas.microsoft.com/office/drawing/2010/main">
+              <a14:hiddenEffects xmlns:a14="http://schemas.microsoft.com/office/drawing/2010/main" xmlns="">
                 <a:effectLst>
                   <a:outerShdw blurRad="63500" dist="38099" dir="2700000" algn="ctr" rotWithShape="0">
                     <a:srgbClr val="000000">
@@ -19052,14 +19137,14 @@
           <a:effectLst/>
           <a:extLst>
             <a:ext uri="{909E8E84-426E-40dd-AFC4-6F175D3DCCD1}">
-              <a14:hiddenFill xmlns="" xmlns:a14="http://schemas.microsoft.com/office/drawing/2010/main">
+              <a14:hiddenFill xmlns:a14="http://schemas.microsoft.com/office/drawing/2010/main" xmlns="">
                 <a:solidFill>
                   <a:srgbClr val="FFFFFF"/>
                 </a:solidFill>
               </a14:hiddenFill>
             </a:ext>
             <a:ext uri="{91240B29-F687-4f45-9708-019B960494DF}">
-              <a14:hiddenLine xmlns="" xmlns:a14="http://schemas.microsoft.com/office/drawing/2010/main" w="12700">
+              <a14:hiddenLine xmlns:a14="http://schemas.microsoft.com/office/drawing/2010/main" xmlns="" w="12700">
                 <a:solidFill>
                   <a:srgbClr val="000000"/>
                 </a:solidFill>
@@ -19069,7 +19154,7 @@
               </a14:hiddenLine>
             </a:ext>
             <a:ext uri="{AF507438-7753-43e0-B8FC-AC1667EBCBE1}">
-              <a14:hiddenEffects xmlns="" xmlns:a14="http://schemas.microsoft.com/office/drawing/2010/main">
+              <a14:hiddenEffects xmlns:a14="http://schemas.microsoft.com/office/drawing/2010/main" xmlns="">
                 <a:effectLst>
                   <a:outerShdw blurRad="63500" dist="38099" dir="2700000" algn="ctr" rotWithShape="0">
                     <a:srgbClr val="000000">
@@ -20340,14 +20425,14 @@
           <a:effectLst/>
           <a:extLst>
             <a:ext uri="{909E8E84-426E-40dd-AFC4-6F175D3DCCD1}">
-              <a14:hiddenFill xmlns="" xmlns:a14="http://schemas.microsoft.com/office/drawing/2010/main">
+              <a14:hiddenFill xmlns:a14="http://schemas.microsoft.com/office/drawing/2010/main" xmlns="">
                 <a:solidFill>
                   <a:srgbClr val="FFFFFF"/>
                 </a:solidFill>
               </a14:hiddenFill>
             </a:ext>
             <a:ext uri="{91240B29-F687-4f45-9708-019B960494DF}">
-              <a14:hiddenLine xmlns="" xmlns:a14="http://schemas.microsoft.com/office/drawing/2010/main" w="12700">
+              <a14:hiddenLine xmlns:a14="http://schemas.microsoft.com/office/drawing/2010/main" xmlns="" w="12700">
                 <a:solidFill>
                   <a:srgbClr val="000000"/>
                 </a:solidFill>
@@ -20357,7 +20442,7 @@
               </a14:hiddenLine>
             </a:ext>
             <a:ext uri="{AF507438-7753-43e0-B8FC-AC1667EBCBE1}">
-              <a14:hiddenEffects xmlns="" xmlns:a14="http://schemas.microsoft.com/office/drawing/2010/main">
+              <a14:hiddenEffects xmlns:a14="http://schemas.microsoft.com/office/drawing/2010/main" xmlns="">
                 <a:effectLst>
                   <a:outerShdw blurRad="63500" dist="38099" dir="2700000" algn="ctr" rotWithShape="0">
                     <a:srgbClr val="000000">
@@ -21433,14 +21518,14 @@
           <a:effectLst/>
           <a:extLst>
             <a:ext uri="{909E8E84-426E-40dd-AFC4-6F175D3DCCD1}">
-              <a14:hiddenFill xmlns="" xmlns:a14="http://schemas.microsoft.com/office/drawing/2010/main">
+              <a14:hiddenFill xmlns:a14="http://schemas.microsoft.com/office/drawing/2010/main" xmlns="">
                 <a:solidFill>
                   <a:srgbClr val="FFFFFF"/>
                 </a:solidFill>
               </a14:hiddenFill>
             </a:ext>
             <a:ext uri="{91240B29-F687-4f45-9708-019B960494DF}">
-              <a14:hiddenLine xmlns="" xmlns:a14="http://schemas.microsoft.com/office/drawing/2010/main" w="12700">
+              <a14:hiddenLine xmlns:a14="http://schemas.microsoft.com/office/drawing/2010/main" xmlns="" w="12700">
                 <a:solidFill>
                   <a:srgbClr val="000000"/>
                 </a:solidFill>
@@ -21450,7 +21535,7 @@
               </a14:hiddenLine>
             </a:ext>
             <a:ext uri="{AF507438-7753-43e0-B8FC-AC1667EBCBE1}">
-              <a14:hiddenEffects xmlns="" xmlns:a14="http://schemas.microsoft.com/office/drawing/2010/main">
+              <a14:hiddenEffects xmlns:a14="http://schemas.microsoft.com/office/drawing/2010/main" xmlns="">
                 <a:effectLst>
                   <a:outerShdw blurRad="63500" dist="38099" dir="2700000" algn="ctr" rotWithShape="0">
                     <a:srgbClr val="000000">
@@ -22526,14 +22611,14 @@
           <a:effectLst/>
           <a:extLst>
             <a:ext uri="{909E8E84-426E-40dd-AFC4-6F175D3DCCD1}">
-              <a14:hiddenFill xmlns="" xmlns:a14="http://schemas.microsoft.com/office/drawing/2010/main">
+              <a14:hiddenFill xmlns:a14="http://schemas.microsoft.com/office/drawing/2010/main" xmlns="">
                 <a:solidFill>
                   <a:srgbClr val="FFFFFF"/>
                 </a:solidFill>
               </a14:hiddenFill>
             </a:ext>
             <a:ext uri="{91240B29-F687-4f45-9708-019B960494DF}">
-              <a14:hiddenLine xmlns="" xmlns:a14="http://schemas.microsoft.com/office/drawing/2010/main" w="12700">
+              <a14:hiddenLine xmlns:a14="http://schemas.microsoft.com/office/drawing/2010/main" xmlns="" w="12700">
                 <a:solidFill>
                   <a:srgbClr val="000000"/>
                 </a:solidFill>
@@ -22543,7 +22628,7 @@
               </a14:hiddenLine>
             </a:ext>
             <a:ext uri="{AF507438-7753-43e0-B8FC-AC1667EBCBE1}">
-              <a14:hiddenEffects xmlns="" xmlns:a14="http://schemas.microsoft.com/office/drawing/2010/main">
+              <a14:hiddenEffects xmlns:a14="http://schemas.microsoft.com/office/drawing/2010/main" xmlns="">
                 <a:effectLst>
                   <a:outerShdw blurRad="63500" dist="38099" dir="2700000" algn="ctr" rotWithShape="0">
                     <a:srgbClr val="000000">
@@ -23098,14 +23183,14 @@
           <a:effectLst/>
           <a:extLst>
             <a:ext uri="{909E8E84-426E-40dd-AFC4-6F175D3DCCD1}">
-              <a14:hiddenFill xmlns="" xmlns:a14="http://schemas.microsoft.com/office/drawing/2010/main">
+              <a14:hiddenFill xmlns:a14="http://schemas.microsoft.com/office/drawing/2010/main" xmlns="">
                 <a:solidFill>
                   <a:srgbClr val="FFFFFF"/>
                 </a:solidFill>
               </a14:hiddenFill>
             </a:ext>
             <a:ext uri="{91240B29-F687-4f45-9708-019B960494DF}">
-              <a14:hiddenLine xmlns="" xmlns:a14="http://schemas.microsoft.com/office/drawing/2010/main" w="12700">
+              <a14:hiddenLine xmlns:a14="http://schemas.microsoft.com/office/drawing/2010/main" xmlns="" w="12700">
                 <a:solidFill>
                   <a:srgbClr val="000000"/>
                 </a:solidFill>
@@ -23115,7 +23200,7 @@
               </a14:hiddenLine>
             </a:ext>
             <a:ext uri="{AF507438-7753-43e0-B8FC-AC1667EBCBE1}">
-              <a14:hiddenEffects xmlns="" xmlns:a14="http://schemas.microsoft.com/office/drawing/2010/main">
+              <a14:hiddenEffects xmlns:a14="http://schemas.microsoft.com/office/drawing/2010/main" xmlns="">
                 <a:effectLst>
                   <a:outerShdw blurRad="63500" dist="38099" dir="2700000" algn="ctr" rotWithShape="0">
                     <a:srgbClr val="000000">
@@ -23504,14 +23589,14 @@
           <a:effectLst/>
           <a:extLst>
             <a:ext uri="{909E8E84-426E-40dd-AFC4-6F175D3DCCD1}">
-              <a14:hiddenFill xmlns="" xmlns:a14="http://schemas.microsoft.com/office/drawing/2010/main">
+              <a14:hiddenFill xmlns:a14="http://schemas.microsoft.com/office/drawing/2010/main" xmlns="">
                 <a:solidFill>
                   <a:srgbClr val="FFFFFF"/>
                 </a:solidFill>
               </a14:hiddenFill>
             </a:ext>
             <a:ext uri="{91240B29-F687-4f45-9708-019B960494DF}">
-              <a14:hiddenLine xmlns="" xmlns:a14="http://schemas.microsoft.com/office/drawing/2010/main" w="12700">
+              <a14:hiddenLine xmlns:a14="http://schemas.microsoft.com/office/drawing/2010/main" xmlns="" w="12700">
                 <a:solidFill>
                   <a:srgbClr val="000000"/>
                 </a:solidFill>
@@ -23521,7 +23606,7 @@
               </a14:hiddenLine>
             </a:ext>
             <a:ext uri="{AF507438-7753-43e0-B8FC-AC1667EBCBE1}">
-              <a14:hiddenEffects xmlns="" xmlns:a14="http://schemas.microsoft.com/office/drawing/2010/main">
+              <a14:hiddenEffects xmlns:a14="http://schemas.microsoft.com/office/drawing/2010/main" xmlns="">
                 <a:effectLst>
                   <a:outerShdw blurRad="63500" dist="38099" dir="2700000" algn="ctr" rotWithShape="0">
                     <a:srgbClr val="000000">
@@ -23640,14 +23725,14 @@
           </a:ln>
           <a:extLst>
             <a:ext uri="{909E8E84-426E-40dd-AFC4-6F175D3DCCD1}">
-              <a14:hiddenFill xmlns="" xmlns:a14="http://schemas.microsoft.com/office/drawing/2010/main">
+              <a14:hiddenFill xmlns:a14="http://schemas.microsoft.com/office/drawing/2010/main" xmlns="">
                 <a:solidFill>
                   <a:srgbClr val="FFFFFF"/>
                 </a:solidFill>
               </a14:hiddenFill>
             </a:ext>
             <a:ext uri="{91240B29-F687-4f45-9708-019B960494DF}">
-              <a14:hiddenLine xmlns="" xmlns:a14="http://schemas.microsoft.com/office/drawing/2010/main" w="9525">
+              <a14:hiddenLine xmlns:a14="http://schemas.microsoft.com/office/drawing/2010/main" xmlns="" w="9525">
                 <a:solidFill>
                   <a:srgbClr val="000000"/>
                 </a:solidFill>
@@ -24156,14 +24241,14 @@
           <a:effectLst/>
           <a:extLst>
             <a:ext uri="{909E8E84-426E-40dd-AFC4-6F175D3DCCD1}">
-              <a14:hiddenFill xmlns="" xmlns:a14="http://schemas.microsoft.com/office/drawing/2010/main">
+              <a14:hiddenFill xmlns:a14="http://schemas.microsoft.com/office/drawing/2010/main" xmlns="">
                 <a:solidFill>
                   <a:srgbClr val="FFFFFF"/>
                 </a:solidFill>
               </a14:hiddenFill>
             </a:ext>
             <a:ext uri="{91240B29-F687-4f45-9708-019B960494DF}">
-              <a14:hiddenLine xmlns="" xmlns:a14="http://schemas.microsoft.com/office/drawing/2010/main" w="12700">
+              <a14:hiddenLine xmlns:a14="http://schemas.microsoft.com/office/drawing/2010/main" xmlns="" w="12700">
                 <a:solidFill>
                   <a:srgbClr val="000000"/>
                 </a:solidFill>
@@ -24173,7 +24258,7 @@
               </a14:hiddenLine>
             </a:ext>
             <a:ext uri="{AF507438-7753-43e0-B8FC-AC1667EBCBE1}">
-              <a14:hiddenEffects xmlns="" xmlns:a14="http://schemas.microsoft.com/office/drawing/2010/main">
+              <a14:hiddenEffects xmlns:a14="http://schemas.microsoft.com/office/drawing/2010/main" xmlns="">
                 <a:effectLst>
                   <a:outerShdw blurRad="63500" dist="38099" dir="2700000" algn="ctr" rotWithShape="0">
                     <a:srgbClr val="000000">
@@ -24694,14 +24779,14 @@
           <a:effectLst/>
           <a:extLst>
             <a:ext uri="{909E8E84-426E-40dd-AFC4-6F175D3DCCD1}">
-              <a14:hiddenFill xmlns="" xmlns:a14="http://schemas.microsoft.com/office/drawing/2010/main">
+              <a14:hiddenFill xmlns:a14="http://schemas.microsoft.com/office/drawing/2010/main" xmlns="">
                 <a:solidFill>
                   <a:srgbClr val="FFFFFF"/>
                 </a:solidFill>
               </a14:hiddenFill>
             </a:ext>
             <a:ext uri="{91240B29-F687-4f45-9708-019B960494DF}">
-              <a14:hiddenLine xmlns="" xmlns:a14="http://schemas.microsoft.com/office/drawing/2010/main" w="12700">
+              <a14:hiddenLine xmlns:a14="http://schemas.microsoft.com/office/drawing/2010/main" xmlns="" w="12700">
                 <a:solidFill>
                   <a:srgbClr val="000000"/>
                 </a:solidFill>
@@ -24711,7 +24796,7 @@
               </a14:hiddenLine>
             </a:ext>
             <a:ext uri="{AF507438-7753-43e0-B8FC-AC1667EBCBE1}">
-              <a14:hiddenEffects xmlns="" xmlns:a14="http://schemas.microsoft.com/office/drawing/2010/main">
+              <a14:hiddenEffects xmlns:a14="http://schemas.microsoft.com/office/drawing/2010/main" xmlns="">
                 <a:effectLst>
                   <a:outerShdw blurRad="63500" dist="38099" dir="2700000" algn="ctr" rotWithShape="0">
                     <a:srgbClr val="000000">
@@ -24872,14 +24957,14 @@
           </a:ln>
           <a:extLst>
             <a:ext uri="{909E8E84-426E-40dd-AFC4-6F175D3DCCD1}">
-              <a14:hiddenFill xmlns="" xmlns:a14="http://schemas.microsoft.com/office/drawing/2010/main">
+              <a14:hiddenFill xmlns:a14="http://schemas.microsoft.com/office/drawing/2010/main" xmlns="">
                 <a:solidFill>
                   <a:srgbClr val="FFFFFF"/>
                 </a:solidFill>
               </a14:hiddenFill>
             </a:ext>
             <a:ext uri="{91240B29-F687-4f45-9708-019B960494DF}">
-              <a14:hiddenLine xmlns="" xmlns:a14="http://schemas.microsoft.com/office/drawing/2010/main" w="9525">
+              <a14:hiddenLine xmlns:a14="http://schemas.microsoft.com/office/drawing/2010/main" xmlns="" w="9525">
                 <a:solidFill>
                   <a:srgbClr val="000000"/>
                 </a:solidFill>
@@ -25306,14 +25391,14 @@
           <a:effectLst/>
           <a:extLst>
             <a:ext uri="{909E8E84-426E-40dd-AFC4-6F175D3DCCD1}">
-              <a14:hiddenFill xmlns="" xmlns:a14="http://schemas.microsoft.com/office/drawing/2010/main">
+              <a14:hiddenFill xmlns:a14="http://schemas.microsoft.com/office/drawing/2010/main" xmlns="">
                 <a:solidFill>
                   <a:srgbClr val="FFFFFF"/>
                 </a:solidFill>
               </a14:hiddenFill>
             </a:ext>
             <a:ext uri="{91240B29-F687-4f45-9708-019B960494DF}">
-              <a14:hiddenLine xmlns="" xmlns:a14="http://schemas.microsoft.com/office/drawing/2010/main" w="12700">
+              <a14:hiddenLine xmlns:a14="http://schemas.microsoft.com/office/drawing/2010/main" xmlns="" w="12700">
                 <a:solidFill>
                   <a:srgbClr val="000000"/>
                 </a:solidFill>
@@ -25323,7 +25408,7 @@
               </a14:hiddenLine>
             </a:ext>
             <a:ext uri="{AF507438-7753-43e0-B8FC-AC1667EBCBE1}">
-              <a14:hiddenEffects xmlns="" xmlns:a14="http://schemas.microsoft.com/office/drawing/2010/main">
+              <a14:hiddenEffects xmlns:a14="http://schemas.microsoft.com/office/drawing/2010/main" xmlns="">
                 <a:effectLst>
                   <a:outerShdw blurRad="63500" dist="38099" dir="2700000" algn="ctr" rotWithShape="0">
                     <a:srgbClr val="000000">
@@ -25484,14 +25569,14 @@
           </a:ln>
           <a:extLst>
             <a:ext uri="{909E8E84-426E-40dd-AFC4-6F175D3DCCD1}">
-              <a14:hiddenFill xmlns="" xmlns:a14="http://schemas.microsoft.com/office/drawing/2010/main">
+              <a14:hiddenFill xmlns:a14="http://schemas.microsoft.com/office/drawing/2010/main" xmlns="">
                 <a:solidFill>
                   <a:srgbClr val="FFFFFF"/>
                 </a:solidFill>
               </a14:hiddenFill>
             </a:ext>
             <a:ext uri="{91240B29-F687-4f45-9708-019B960494DF}">
-              <a14:hiddenLine xmlns="" xmlns:a14="http://schemas.microsoft.com/office/drawing/2010/main" w="9525">
+              <a14:hiddenLine xmlns:a14="http://schemas.microsoft.com/office/drawing/2010/main" xmlns="" w="9525">
                 <a:solidFill>
                   <a:srgbClr val="000000"/>
                 </a:solidFill>
@@ -25918,14 +26003,14 @@
           <a:effectLst/>
           <a:extLst>
             <a:ext uri="{909E8E84-426E-40dd-AFC4-6F175D3DCCD1}">
-              <a14:hiddenFill xmlns="" xmlns:a14="http://schemas.microsoft.com/office/drawing/2010/main">
+              <a14:hiddenFill xmlns:a14="http://schemas.microsoft.com/office/drawing/2010/main" xmlns="">
                 <a:solidFill>
                   <a:srgbClr val="FFFFFF"/>
                 </a:solidFill>
               </a14:hiddenFill>
             </a:ext>
             <a:ext uri="{91240B29-F687-4f45-9708-019B960494DF}">
-              <a14:hiddenLine xmlns="" xmlns:a14="http://schemas.microsoft.com/office/drawing/2010/main" w="12700">
+              <a14:hiddenLine xmlns:a14="http://schemas.microsoft.com/office/drawing/2010/main" xmlns="" w="12700">
                 <a:solidFill>
                   <a:srgbClr val="000000"/>
                 </a:solidFill>
@@ -25935,7 +26020,7 @@
               </a14:hiddenLine>
             </a:ext>
             <a:ext uri="{AF507438-7753-43e0-B8FC-AC1667EBCBE1}">
-              <a14:hiddenEffects xmlns="" xmlns:a14="http://schemas.microsoft.com/office/drawing/2010/main">
+              <a14:hiddenEffects xmlns:a14="http://schemas.microsoft.com/office/drawing/2010/main" xmlns="">
                 <a:effectLst>
                   <a:outerShdw blurRad="63500" dist="38099" dir="2700000" algn="ctr" rotWithShape="0">
                     <a:srgbClr val="000000">
@@ -26096,14 +26181,14 @@
           </a:ln>
           <a:extLst>
             <a:ext uri="{909E8E84-426E-40dd-AFC4-6F175D3DCCD1}">
-              <a14:hiddenFill xmlns="" xmlns:a14="http://schemas.microsoft.com/office/drawing/2010/main">
+              <a14:hiddenFill xmlns:a14="http://schemas.microsoft.com/office/drawing/2010/main" xmlns="">
                 <a:solidFill>
                   <a:srgbClr val="FFFFFF"/>
                 </a:solidFill>
               </a14:hiddenFill>
             </a:ext>
             <a:ext uri="{91240B29-F687-4f45-9708-019B960494DF}">
-              <a14:hiddenLine xmlns="" xmlns:a14="http://schemas.microsoft.com/office/drawing/2010/main" w="9525">
+              <a14:hiddenLine xmlns:a14="http://schemas.microsoft.com/office/drawing/2010/main" xmlns="" w="9525">
                 <a:solidFill>
                   <a:srgbClr val="000000"/>
                 </a:solidFill>
@@ -26530,14 +26615,14 @@
           <a:effectLst/>
           <a:extLst>
             <a:ext uri="{909E8E84-426E-40dd-AFC4-6F175D3DCCD1}">
-              <a14:hiddenFill xmlns="" xmlns:a14="http://schemas.microsoft.com/office/drawing/2010/main">
+              <a14:hiddenFill xmlns:a14="http://schemas.microsoft.com/office/drawing/2010/main" xmlns="">
                 <a:solidFill>
                   <a:srgbClr val="FFFFFF"/>
                 </a:solidFill>
               </a14:hiddenFill>
             </a:ext>
             <a:ext uri="{91240B29-F687-4f45-9708-019B960494DF}">
-              <a14:hiddenLine xmlns="" xmlns:a14="http://schemas.microsoft.com/office/drawing/2010/main" w="12700">
+              <a14:hiddenLine xmlns:a14="http://schemas.microsoft.com/office/drawing/2010/main" xmlns="" w="12700">
                 <a:solidFill>
                   <a:srgbClr val="000000"/>
                 </a:solidFill>
@@ -26547,7 +26632,7 @@
               </a14:hiddenLine>
             </a:ext>
             <a:ext uri="{AF507438-7753-43e0-B8FC-AC1667EBCBE1}">
-              <a14:hiddenEffects xmlns="" xmlns:a14="http://schemas.microsoft.com/office/drawing/2010/main">
+              <a14:hiddenEffects xmlns:a14="http://schemas.microsoft.com/office/drawing/2010/main" xmlns="">
                 <a:effectLst>
                   <a:outerShdw blurRad="63500" dist="38099" dir="2700000" algn="ctr" rotWithShape="0">
                     <a:srgbClr val="000000">
@@ -26708,14 +26793,14 @@
           </a:ln>
           <a:extLst>
             <a:ext uri="{909E8E84-426E-40dd-AFC4-6F175D3DCCD1}">
-              <a14:hiddenFill xmlns="" xmlns:a14="http://schemas.microsoft.com/office/drawing/2010/main">
+              <a14:hiddenFill xmlns:a14="http://schemas.microsoft.com/office/drawing/2010/main" xmlns="">
                 <a:solidFill>
                   <a:srgbClr val="FFFFFF"/>
                 </a:solidFill>
               </a14:hiddenFill>
             </a:ext>
             <a:ext uri="{91240B29-F687-4f45-9708-019B960494DF}">
-              <a14:hiddenLine xmlns="" xmlns:a14="http://schemas.microsoft.com/office/drawing/2010/main" w="9525">
+              <a14:hiddenLine xmlns:a14="http://schemas.microsoft.com/office/drawing/2010/main" xmlns="" w="9525">
                 <a:solidFill>
                   <a:srgbClr val="000000"/>
                 </a:solidFill>
@@ -27142,14 +27227,14 @@
           <a:effectLst/>
           <a:extLst>
             <a:ext uri="{909E8E84-426E-40dd-AFC4-6F175D3DCCD1}">
-              <a14:hiddenFill xmlns="" xmlns:a14="http://schemas.microsoft.com/office/drawing/2010/main">
+              <a14:hiddenFill xmlns:a14="http://schemas.microsoft.com/office/drawing/2010/main" xmlns="">
                 <a:solidFill>
                   <a:srgbClr val="FFFFFF"/>
                 </a:solidFill>
               </a14:hiddenFill>
             </a:ext>
             <a:ext uri="{91240B29-F687-4f45-9708-019B960494DF}">
-              <a14:hiddenLine xmlns="" xmlns:a14="http://schemas.microsoft.com/office/drawing/2010/main" w="12700">
+              <a14:hiddenLine xmlns:a14="http://schemas.microsoft.com/office/drawing/2010/main" xmlns="" w="12700">
                 <a:solidFill>
                   <a:srgbClr val="000000"/>
                 </a:solidFill>
@@ -27159,7 +27244,7 @@
               </a14:hiddenLine>
             </a:ext>
             <a:ext uri="{AF507438-7753-43e0-B8FC-AC1667EBCBE1}">
-              <a14:hiddenEffects xmlns="" xmlns:a14="http://schemas.microsoft.com/office/drawing/2010/main">
+              <a14:hiddenEffects xmlns:a14="http://schemas.microsoft.com/office/drawing/2010/main" xmlns="">
                 <a:effectLst>
                   <a:outerShdw blurRad="63500" dist="38099" dir="2700000" algn="ctr" rotWithShape="0">
                     <a:srgbClr val="000000">
@@ -27320,14 +27405,14 @@
           </a:ln>
           <a:extLst>
             <a:ext uri="{909E8E84-426E-40dd-AFC4-6F175D3DCCD1}">
-              <a14:hiddenFill xmlns="" xmlns:a14="http://schemas.microsoft.com/office/drawing/2010/main">
+              <a14:hiddenFill xmlns:a14="http://schemas.microsoft.com/office/drawing/2010/main" xmlns="">
                 <a:solidFill>
                   <a:srgbClr val="FFFFFF"/>
                 </a:solidFill>
               </a14:hiddenFill>
             </a:ext>
             <a:ext uri="{91240B29-F687-4f45-9708-019B960494DF}">
-              <a14:hiddenLine xmlns="" xmlns:a14="http://schemas.microsoft.com/office/drawing/2010/main" w="9525">
+              <a14:hiddenLine xmlns:a14="http://schemas.microsoft.com/office/drawing/2010/main" xmlns="" w="9525">
                 <a:solidFill>
                   <a:srgbClr val="000000"/>
                 </a:solidFill>
@@ -30177,7 +30262,7 @@
                 <a:latin typeface="Courier New"/>
                 <a:cs typeface="Courier New"/>
               </a:rPr>
-              <a:t>lines.collect</a:t>
+              <a:t>lines.take</a:t>
             </a:r>
             <a:r>
               <a:rPr lang="en-US" sz="1800" b="1" dirty="0">

</xml_diff>

<commit_message>
Fixed minor bugs found while teaching in Scottsdale Sept 18 2018
</commit_message>
<xml_diff>
--- a/lesson-520-developing-with-rdds/slides/developing-with-rdds.pptx
+++ b/lesson-520-developing-with-rdds/slides/developing-with-rdds.pptx
@@ -249,7 +249,7 @@
             <a:fld id="{7E6858BF-E995-6B4A-A066-18CA04BBA799}" type="datetimeFigureOut">
               <a:rPr lang="en-US" smtClean="0"/>
               <a:pPr/>
-              <a:t>5/7/18</a:t>
+              <a:t>9/17/18</a:t>
             </a:fld>
             <a:endParaRPr lang="en-US"/>
           </a:p>
@@ -417,7 +417,7 @@
             <a:fld id="{D88695E9-1DC5-9344-A1C3-9069609C108C}" type="datetimeFigureOut">
               <a:rPr lang="en-US" smtClean="0"/>
               <a:pPr/>
-              <a:t>5/7/18</a:t>
+              <a:t>9/17/18</a:t>
             </a:fld>
             <a:endParaRPr lang="en-US"/>
           </a:p>
@@ -1132,14 +1132,14 @@
           </a:ln>
           <a:extLst>
             <a:ext uri="{909E8E84-426E-40dd-AFC4-6F175D3DCCD1}">
-              <a14:hiddenFill xmlns:a14="http://schemas.microsoft.com/office/drawing/2010/main" xmlns="">
+              <a14:hiddenFill xmlns="" xmlns:a14="http://schemas.microsoft.com/office/drawing/2010/main">
                 <a:solidFill>
                   <a:srgbClr val="FFFFFF"/>
                 </a:solidFill>
               </a14:hiddenFill>
             </a:ext>
             <a:ext uri="{91240B29-F687-4f45-9708-019B960494DF}">
-              <a14:hiddenLine xmlns:a14="http://schemas.microsoft.com/office/drawing/2010/main" xmlns="" w="9525">
+              <a14:hiddenLine xmlns="" xmlns:a14="http://schemas.microsoft.com/office/drawing/2010/main" w="9525">
                 <a:solidFill>
                   <a:srgbClr val="000000"/>
                 </a:solidFill>
@@ -1228,14 +1228,14 @@
           <a:effectLst/>
           <a:extLst>
             <a:ext uri="{909E8E84-426E-40dd-AFC4-6F175D3DCCD1}">
-              <a14:hiddenFill xmlns:a14="http://schemas.microsoft.com/office/drawing/2010/main" xmlns="">
+              <a14:hiddenFill xmlns="" xmlns:a14="http://schemas.microsoft.com/office/drawing/2010/main">
                 <a:solidFill>
                   <a:srgbClr val="FFFFFF"/>
                 </a:solidFill>
               </a14:hiddenFill>
             </a:ext>
             <a:ext uri="{91240B29-F687-4f45-9708-019B960494DF}">
-              <a14:hiddenLine xmlns:a14="http://schemas.microsoft.com/office/drawing/2010/main" xmlns="" w="12700">
+              <a14:hiddenLine xmlns="" xmlns:a14="http://schemas.microsoft.com/office/drawing/2010/main" w="12700">
                 <a:solidFill>
                   <a:srgbClr val="000000"/>
                 </a:solidFill>
@@ -1245,7 +1245,7 @@
               </a14:hiddenLine>
             </a:ext>
             <a:ext uri="{AF507438-7753-43e0-B8FC-AC1667EBCBE1}">
-              <a14:hiddenEffects xmlns:a14="http://schemas.microsoft.com/office/drawing/2010/main" xmlns="">
+              <a14:hiddenEffects xmlns="" xmlns:a14="http://schemas.microsoft.com/office/drawing/2010/main">
                 <a:effectLst>
                   <a:outerShdw blurRad="63500" dist="38099" dir="2700000" algn="ctr" rotWithShape="0">
                     <a:srgbClr val="000000">
@@ -1652,14 +1652,14 @@
           <a:effectLst/>
           <a:extLst>
             <a:ext uri="{909E8E84-426E-40dd-AFC4-6F175D3DCCD1}">
-              <a14:hiddenFill xmlns:a14="http://schemas.microsoft.com/office/drawing/2010/main" xmlns="">
+              <a14:hiddenFill xmlns="" xmlns:a14="http://schemas.microsoft.com/office/drawing/2010/main">
                 <a:solidFill>
                   <a:srgbClr val="FFFFFF"/>
                 </a:solidFill>
               </a14:hiddenFill>
             </a:ext>
             <a:ext uri="{91240B29-F687-4f45-9708-019B960494DF}">
-              <a14:hiddenLine xmlns:a14="http://schemas.microsoft.com/office/drawing/2010/main" xmlns="" w="12700">
+              <a14:hiddenLine xmlns="" xmlns:a14="http://schemas.microsoft.com/office/drawing/2010/main" w="12700">
                 <a:solidFill>
                   <a:srgbClr val="000000"/>
                 </a:solidFill>
@@ -1669,7 +1669,7 @@
               </a14:hiddenLine>
             </a:ext>
             <a:ext uri="{AF507438-7753-43e0-B8FC-AC1667EBCBE1}">
-              <a14:hiddenEffects xmlns:a14="http://schemas.microsoft.com/office/drawing/2010/main" xmlns="">
+              <a14:hiddenEffects xmlns="" xmlns:a14="http://schemas.microsoft.com/office/drawing/2010/main">
                 <a:effectLst>
                   <a:outerShdw blurRad="63500" dist="38099" dir="2700000" algn="ctr" rotWithShape="0">
                     <a:srgbClr val="000000">
@@ -1830,14 +1830,14 @@
           </a:ln>
           <a:extLst>
             <a:ext uri="{909E8E84-426E-40dd-AFC4-6F175D3DCCD1}">
-              <a14:hiddenFill xmlns:a14="http://schemas.microsoft.com/office/drawing/2010/main" xmlns="">
+              <a14:hiddenFill xmlns="" xmlns:a14="http://schemas.microsoft.com/office/drawing/2010/main">
                 <a:solidFill>
                   <a:srgbClr val="FFFFFF"/>
                 </a:solidFill>
               </a14:hiddenFill>
             </a:ext>
             <a:ext uri="{91240B29-F687-4f45-9708-019B960494DF}">
-              <a14:hiddenLine xmlns:a14="http://schemas.microsoft.com/office/drawing/2010/main" xmlns="" w="9525">
+              <a14:hiddenLine xmlns="" xmlns:a14="http://schemas.microsoft.com/office/drawing/2010/main" w="9525">
                 <a:solidFill>
                   <a:srgbClr val="000000"/>
                 </a:solidFill>
@@ -2164,14 +2164,14 @@
           <a:effectLst/>
           <a:extLst>
             <a:ext uri="{909E8E84-426E-40dd-AFC4-6F175D3DCCD1}">
-              <a14:hiddenFill xmlns:a14="http://schemas.microsoft.com/office/drawing/2010/main" xmlns="">
+              <a14:hiddenFill xmlns="" xmlns:a14="http://schemas.microsoft.com/office/drawing/2010/main">
                 <a:solidFill>
                   <a:srgbClr val="FFFFFF"/>
                 </a:solidFill>
               </a14:hiddenFill>
             </a:ext>
             <a:ext uri="{91240B29-F687-4f45-9708-019B960494DF}">
-              <a14:hiddenLine xmlns:a14="http://schemas.microsoft.com/office/drawing/2010/main" xmlns="" w="12700">
+              <a14:hiddenLine xmlns="" xmlns:a14="http://schemas.microsoft.com/office/drawing/2010/main" w="12700">
                 <a:solidFill>
                   <a:srgbClr val="000000"/>
                 </a:solidFill>
@@ -2181,7 +2181,7 @@
               </a14:hiddenLine>
             </a:ext>
             <a:ext uri="{AF507438-7753-43e0-B8FC-AC1667EBCBE1}">
-              <a14:hiddenEffects xmlns:a14="http://schemas.microsoft.com/office/drawing/2010/main" xmlns="">
+              <a14:hiddenEffects xmlns="" xmlns:a14="http://schemas.microsoft.com/office/drawing/2010/main">
                 <a:effectLst>
                   <a:outerShdw blurRad="63500" dist="38099" dir="2700000" algn="ctr" rotWithShape="0">
                     <a:srgbClr val="000000">
@@ -2412,14 +2412,14 @@
           </a:ln>
           <a:extLst>
             <a:ext uri="{909E8E84-426E-40dd-AFC4-6F175D3DCCD1}">
-              <a14:hiddenFill xmlns:a14="http://schemas.microsoft.com/office/drawing/2010/main" xmlns="">
+              <a14:hiddenFill xmlns="" xmlns:a14="http://schemas.microsoft.com/office/drawing/2010/main">
                 <a:solidFill>
                   <a:srgbClr val="FFFFFF"/>
                 </a:solidFill>
               </a14:hiddenFill>
             </a:ext>
             <a:ext uri="{91240B29-F687-4f45-9708-019B960494DF}">
-              <a14:hiddenLine xmlns:a14="http://schemas.microsoft.com/office/drawing/2010/main" xmlns="" w="9525">
+              <a14:hiddenLine xmlns="" xmlns:a14="http://schemas.microsoft.com/office/drawing/2010/main" w="9525">
                 <a:solidFill>
                   <a:srgbClr val="000000"/>
                 </a:solidFill>
@@ -2775,14 +2775,14 @@
           <a:effectLst/>
           <a:extLst>
             <a:ext uri="{909E8E84-426E-40dd-AFC4-6F175D3DCCD1}">
-              <a14:hiddenFill xmlns:a14="http://schemas.microsoft.com/office/drawing/2010/main" xmlns="">
+              <a14:hiddenFill xmlns="" xmlns:a14="http://schemas.microsoft.com/office/drawing/2010/main">
                 <a:solidFill>
                   <a:srgbClr val="FFFFFF"/>
                 </a:solidFill>
               </a14:hiddenFill>
             </a:ext>
             <a:ext uri="{91240B29-F687-4f45-9708-019B960494DF}">
-              <a14:hiddenLine xmlns:a14="http://schemas.microsoft.com/office/drawing/2010/main" xmlns="" w="12700">
+              <a14:hiddenLine xmlns="" xmlns:a14="http://schemas.microsoft.com/office/drawing/2010/main" w="12700">
                 <a:solidFill>
                   <a:srgbClr val="000000"/>
                 </a:solidFill>
@@ -2792,7 +2792,7 @@
               </a14:hiddenLine>
             </a:ext>
             <a:ext uri="{AF507438-7753-43e0-B8FC-AC1667EBCBE1}">
-              <a14:hiddenEffects xmlns:a14="http://schemas.microsoft.com/office/drawing/2010/main" xmlns="">
+              <a14:hiddenEffects xmlns="" xmlns:a14="http://schemas.microsoft.com/office/drawing/2010/main">
                 <a:effectLst>
                   <a:outerShdw blurRad="63500" dist="38099" dir="2700000" algn="ctr" rotWithShape="0">
                     <a:srgbClr val="000000">
@@ -3023,14 +3023,14 @@
           </a:ln>
           <a:extLst>
             <a:ext uri="{909E8E84-426E-40dd-AFC4-6F175D3DCCD1}">
-              <a14:hiddenFill xmlns:a14="http://schemas.microsoft.com/office/drawing/2010/main" xmlns="">
+              <a14:hiddenFill xmlns="" xmlns:a14="http://schemas.microsoft.com/office/drawing/2010/main">
                 <a:solidFill>
                   <a:srgbClr val="FFFFFF"/>
                 </a:solidFill>
               </a14:hiddenFill>
             </a:ext>
             <a:ext uri="{91240B29-F687-4f45-9708-019B960494DF}">
-              <a14:hiddenLine xmlns:a14="http://schemas.microsoft.com/office/drawing/2010/main" xmlns="" w="9525">
+              <a14:hiddenLine xmlns="" xmlns:a14="http://schemas.microsoft.com/office/drawing/2010/main" w="9525">
                 <a:solidFill>
                   <a:srgbClr val="000000"/>
                 </a:solidFill>
@@ -3823,14 +3823,14 @@
           <a:effectLst/>
           <a:extLst>
             <a:ext uri="{909E8E84-426E-40dd-AFC4-6F175D3DCCD1}">
-              <a14:hiddenFill xmlns:a14="http://schemas.microsoft.com/office/drawing/2010/main" xmlns="">
+              <a14:hiddenFill xmlns="" xmlns:a14="http://schemas.microsoft.com/office/drawing/2010/main">
                 <a:solidFill>
                   <a:srgbClr val="FFFFFF"/>
                 </a:solidFill>
               </a14:hiddenFill>
             </a:ext>
             <a:ext uri="{91240B29-F687-4f45-9708-019B960494DF}">
-              <a14:hiddenLine xmlns:a14="http://schemas.microsoft.com/office/drawing/2010/main" xmlns="" w="12700">
+              <a14:hiddenLine xmlns="" xmlns:a14="http://schemas.microsoft.com/office/drawing/2010/main" w="12700">
                 <a:solidFill>
                   <a:srgbClr val="000000"/>
                 </a:solidFill>
@@ -3840,7 +3840,7 @@
               </a14:hiddenLine>
             </a:ext>
             <a:ext uri="{AF507438-7753-43e0-B8FC-AC1667EBCBE1}">
-              <a14:hiddenEffects xmlns:a14="http://schemas.microsoft.com/office/drawing/2010/main" xmlns="">
+              <a14:hiddenEffects xmlns="" xmlns:a14="http://schemas.microsoft.com/office/drawing/2010/main">
                 <a:effectLst>
                   <a:outerShdw blurRad="63500" dist="38099" dir="2700000" algn="ctr" rotWithShape="0">
                     <a:srgbClr val="000000">
@@ -4001,14 +4001,14 @@
           </a:ln>
           <a:extLst>
             <a:ext uri="{909E8E84-426E-40dd-AFC4-6F175D3DCCD1}">
-              <a14:hiddenFill xmlns:a14="http://schemas.microsoft.com/office/drawing/2010/main" xmlns="">
+              <a14:hiddenFill xmlns="" xmlns:a14="http://schemas.microsoft.com/office/drawing/2010/main">
                 <a:solidFill>
                   <a:srgbClr val="FFFFFF"/>
                 </a:solidFill>
               </a14:hiddenFill>
             </a:ext>
             <a:ext uri="{91240B29-F687-4f45-9708-019B960494DF}">
-              <a14:hiddenLine xmlns:a14="http://schemas.microsoft.com/office/drawing/2010/main" xmlns="" w="9525">
+              <a14:hiddenLine xmlns="" xmlns:a14="http://schemas.microsoft.com/office/drawing/2010/main" w="9525">
                 <a:solidFill>
                   <a:srgbClr val="000000"/>
                 </a:solidFill>
@@ -4335,14 +4335,14 @@
           <a:effectLst/>
           <a:extLst>
             <a:ext uri="{909E8E84-426E-40dd-AFC4-6F175D3DCCD1}">
-              <a14:hiddenFill xmlns:a14="http://schemas.microsoft.com/office/drawing/2010/main" xmlns="">
+              <a14:hiddenFill xmlns="" xmlns:a14="http://schemas.microsoft.com/office/drawing/2010/main">
                 <a:solidFill>
                   <a:srgbClr val="FFFFFF"/>
                 </a:solidFill>
               </a14:hiddenFill>
             </a:ext>
             <a:ext uri="{91240B29-F687-4f45-9708-019B960494DF}">
-              <a14:hiddenLine xmlns:a14="http://schemas.microsoft.com/office/drawing/2010/main" xmlns="" w="12700">
+              <a14:hiddenLine xmlns="" xmlns:a14="http://schemas.microsoft.com/office/drawing/2010/main" w="12700">
                 <a:solidFill>
                   <a:srgbClr val="000000"/>
                 </a:solidFill>
@@ -4352,7 +4352,7 @@
               </a14:hiddenLine>
             </a:ext>
             <a:ext uri="{AF507438-7753-43e0-B8FC-AC1667EBCBE1}">
-              <a14:hiddenEffects xmlns:a14="http://schemas.microsoft.com/office/drawing/2010/main" xmlns="">
+              <a14:hiddenEffects xmlns="" xmlns:a14="http://schemas.microsoft.com/office/drawing/2010/main">
                 <a:effectLst>
                   <a:outerShdw blurRad="63500" dist="38099" dir="2700000" algn="ctr" rotWithShape="0">
                     <a:srgbClr val="000000">
@@ -4583,14 +4583,14 @@
           </a:ln>
           <a:extLst>
             <a:ext uri="{909E8E84-426E-40dd-AFC4-6F175D3DCCD1}">
-              <a14:hiddenFill xmlns:a14="http://schemas.microsoft.com/office/drawing/2010/main" xmlns="">
+              <a14:hiddenFill xmlns="" xmlns:a14="http://schemas.microsoft.com/office/drawing/2010/main">
                 <a:solidFill>
                   <a:srgbClr val="FFFFFF"/>
                 </a:solidFill>
               </a14:hiddenFill>
             </a:ext>
             <a:ext uri="{91240B29-F687-4f45-9708-019B960494DF}">
-              <a14:hiddenLine xmlns:a14="http://schemas.microsoft.com/office/drawing/2010/main" xmlns="" w="9525">
+              <a14:hiddenLine xmlns="" xmlns:a14="http://schemas.microsoft.com/office/drawing/2010/main" w="9525">
                 <a:solidFill>
                   <a:srgbClr val="000000"/>
                 </a:solidFill>
@@ -4917,14 +4917,14 @@
           <a:effectLst/>
           <a:extLst>
             <a:ext uri="{909E8E84-426E-40dd-AFC4-6F175D3DCCD1}">
-              <a14:hiddenFill xmlns:a14="http://schemas.microsoft.com/office/drawing/2010/main" xmlns="">
+              <a14:hiddenFill xmlns="" xmlns:a14="http://schemas.microsoft.com/office/drawing/2010/main">
                 <a:solidFill>
                   <a:srgbClr val="FFFFFF"/>
                 </a:solidFill>
               </a14:hiddenFill>
             </a:ext>
             <a:ext uri="{91240B29-F687-4f45-9708-019B960494DF}">
-              <a14:hiddenLine xmlns:a14="http://schemas.microsoft.com/office/drawing/2010/main" xmlns="" w="12700">
+              <a14:hiddenLine xmlns="" xmlns:a14="http://schemas.microsoft.com/office/drawing/2010/main" w="12700">
                 <a:solidFill>
                   <a:srgbClr val="000000"/>
                 </a:solidFill>
@@ -4934,7 +4934,7 @@
               </a14:hiddenLine>
             </a:ext>
             <a:ext uri="{AF507438-7753-43e0-B8FC-AC1667EBCBE1}">
-              <a14:hiddenEffects xmlns:a14="http://schemas.microsoft.com/office/drawing/2010/main" xmlns="">
+              <a14:hiddenEffects xmlns="" xmlns:a14="http://schemas.microsoft.com/office/drawing/2010/main">
                 <a:effectLst>
                   <a:outerShdw blurRad="63500" dist="38099" dir="2700000" algn="ctr" rotWithShape="0">
                     <a:srgbClr val="000000">
@@ -5375,14 +5375,14 @@
           </a:ln>
           <a:extLst>
             <a:ext uri="{909E8E84-426E-40dd-AFC4-6F175D3DCCD1}">
-              <a14:hiddenFill xmlns:a14="http://schemas.microsoft.com/office/drawing/2010/main" xmlns="">
+              <a14:hiddenFill xmlns="" xmlns:a14="http://schemas.microsoft.com/office/drawing/2010/main">
                 <a:solidFill>
                   <a:srgbClr val="FFFFFF"/>
                 </a:solidFill>
               </a14:hiddenFill>
             </a:ext>
             <a:ext uri="{91240B29-F687-4f45-9708-019B960494DF}">
-              <a14:hiddenLine xmlns:a14="http://schemas.microsoft.com/office/drawing/2010/main" xmlns="" w="9525">
+              <a14:hiddenLine xmlns="" xmlns:a14="http://schemas.microsoft.com/office/drawing/2010/main" w="9525">
                 <a:solidFill>
                   <a:srgbClr val="000000"/>
                 </a:solidFill>
@@ -5709,14 +5709,14 @@
           <a:effectLst/>
           <a:extLst>
             <a:ext uri="{909E8E84-426E-40dd-AFC4-6F175D3DCCD1}">
-              <a14:hiddenFill xmlns:a14="http://schemas.microsoft.com/office/drawing/2010/main" xmlns="">
+              <a14:hiddenFill xmlns="" xmlns:a14="http://schemas.microsoft.com/office/drawing/2010/main">
                 <a:solidFill>
                   <a:srgbClr val="FFFFFF"/>
                 </a:solidFill>
               </a14:hiddenFill>
             </a:ext>
             <a:ext uri="{91240B29-F687-4f45-9708-019B960494DF}">
-              <a14:hiddenLine xmlns:a14="http://schemas.microsoft.com/office/drawing/2010/main" xmlns="" w="12700">
+              <a14:hiddenLine xmlns="" xmlns:a14="http://schemas.microsoft.com/office/drawing/2010/main" w="12700">
                 <a:solidFill>
                   <a:srgbClr val="000000"/>
                 </a:solidFill>
@@ -5726,7 +5726,7 @@
               </a14:hiddenLine>
             </a:ext>
             <a:ext uri="{AF507438-7753-43e0-B8FC-AC1667EBCBE1}">
-              <a14:hiddenEffects xmlns:a14="http://schemas.microsoft.com/office/drawing/2010/main" xmlns="">
+              <a14:hiddenEffects xmlns="" xmlns:a14="http://schemas.microsoft.com/office/drawing/2010/main">
                 <a:effectLst>
                   <a:outerShdw blurRad="63500" dist="38099" dir="2700000" algn="ctr" rotWithShape="0">
                     <a:srgbClr val="000000">
@@ -6198,14 +6198,14 @@
           </a:ln>
           <a:extLst>
             <a:ext uri="{909E8E84-426E-40dd-AFC4-6F175D3DCCD1}">
-              <a14:hiddenFill xmlns:a14="http://schemas.microsoft.com/office/drawing/2010/main" xmlns="">
+              <a14:hiddenFill xmlns="" xmlns:a14="http://schemas.microsoft.com/office/drawing/2010/main">
                 <a:solidFill>
                   <a:srgbClr val="FFFFFF"/>
                 </a:solidFill>
               </a14:hiddenFill>
             </a:ext>
             <a:ext uri="{91240B29-F687-4f45-9708-019B960494DF}">
-              <a14:hiddenLine xmlns:a14="http://schemas.microsoft.com/office/drawing/2010/main" xmlns="" w="9525">
+              <a14:hiddenLine xmlns="" xmlns:a14="http://schemas.microsoft.com/office/drawing/2010/main" w="9525">
                 <a:solidFill>
                   <a:srgbClr val="000000"/>
                 </a:solidFill>
@@ -6532,14 +6532,14 @@
           <a:effectLst/>
           <a:extLst>
             <a:ext uri="{909E8E84-426E-40dd-AFC4-6F175D3DCCD1}">
-              <a14:hiddenFill xmlns:a14="http://schemas.microsoft.com/office/drawing/2010/main" xmlns="">
+              <a14:hiddenFill xmlns="" xmlns:a14="http://schemas.microsoft.com/office/drawing/2010/main">
                 <a:solidFill>
                   <a:srgbClr val="FFFFFF"/>
                 </a:solidFill>
               </a14:hiddenFill>
             </a:ext>
             <a:ext uri="{91240B29-F687-4f45-9708-019B960494DF}">
-              <a14:hiddenLine xmlns:a14="http://schemas.microsoft.com/office/drawing/2010/main" xmlns="" w="12700">
+              <a14:hiddenLine xmlns="" xmlns:a14="http://schemas.microsoft.com/office/drawing/2010/main" w="12700">
                 <a:solidFill>
                   <a:srgbClr val="000000"/>
                 </a:solidFill>
@@ -6549,7 +6549,7 @@
               </a14:hiddenLine>
             </a:ext>
             <a:ext uri="{AF507438-7753-43e0-B8FC-AC1667EBCBE1}">
-              <a14:hiddenEffects xmlns:a14="http://schemas.microsoft.com/office/drawing/2010/main" xmlns="">
+              <a14:hiddenEffects xmlns="" xmlns:a14="http://schemas.microsoft.com/office/drawing/2010/main">
                 <a:effectLst>
                   <a:outerShdw blurRad="63500" dist="38099" dir="2700000" algn="ctr" rotWithShape="0">
                     <a:srgbClr val="000000">
@@ -7270,14 +7270,14 @@
           </a:ln>
           <a:extLst>
             <a:ext uri="{909E8E84-426E-40dd-AFC4-6F175D3DCCD1}">
-              <a14:hiddenFill xmlns:a14="http://schemas.microsoft.com/office/drawing/2010/main" xmlns="">
+              <a14:hiddenFill xmlns="" xmlns:a14="http://schemas.microsoft.com/office/drawing/2010/main">
                 <a:solidFill>
                   <a:srgbClr val="FFFFFF"/>
                 </a:solidFill>
               </a14:hiddenFill>
             </a:ext>
             <a:ext uri="{91240B29-F687-4f45-9708-019B960494DF}">
-              <a14:hiddenLine xmlns:a14="http://schemas.microsoft.com/office/drawing/2010/main" xmlns="" w="9525">
+              <a14:hiddenLine xmlns="" xmlns:a14="http://schemas.microsoft.com/office/drawing/2010/main" w="9525">
                 <a:solidFill>
                   <a:srgbClr val="000000"/>
                 </a:solidFill>
@@ -7604,14 +7604,14 @@
           <a:effectLst/>
           <a:extLst>
             <a:ext uri="{909E8E84-426E-40dd-AFC4-6F175D3DCCD1}">
-              <a14:hiddenFill xmlns:a14="http://schemas.microsoft.com/office/drawing/2010/main" xmlns="">
+              <a14:hiddenFill xmlns="" xmlns:a14="http://schemas.microsoft.com/office/drawing/2010/main">
                 <a:solidFill>
                   <a:srgbClr val="FFFFFF"/>
                 </a:solidFill>
               </a14:hiddenFill>
             </a:ext>
             <a:ext uri="{91240B29-F687-4f45-9708-019B960494DF}">
-              <a14:hiddenLine xmlns:a14="http://schemas.microsoft.com/office/drawing/2010/main" xmlns="" w="12700">
+              <a14:hiddenLine xmlns="" xmlns:a14="http://schemas.microsoft.com/office/drawing/2010/main" w="12700">
                 <a:solidFill>
                   <a:srgbClr val="000000"/>
                 </a:solidFill>
@@ -7621,7 +7621,7 @@
               </a14:hiddenLine>
             </a:ext>
             <a:ext uri="{AF507438-7753-43e0-B8FC-AC1667EBCBE1}">
-              <a14:hiddenEffects xmlns:a14="http://schemas.microsoft.com/office/drawing/2010/main" xmlns="">
+              <a14:hiddenEffects xmlns="" xmlns:a14="http://schemas.microsoft.com/office/drawing/2010/main">
                 <a:effectLst>
                   <a:outerShdw blurRad="63500" dist="38099" dir="2700000" algn="ctr" rotWithShape="0">
                     <a:srgbClr val="000000">
@@ -7873,14 +7873,14 @@
           </a:ln>
           <a:extLst>
             <a:ext uri="{909E8E84-426E-40dd-AFC4-6F175D3DCCD1}">
-              <a14:hiddenFill xmlns:a14="http://schemas.microsoft.com/office/drawing/2010/main" xmlns="">
+              <a14:hiddenFill xmlns="" xmlns:a14="http://schemas.microsoft.com/office/drawing/2010/main">
                 <a:solidFill>
                   <a:srgbClr val="FFFFFF"/>
                 </a:solidFill>
               </a14:hiddenFill>
             </a:ext>
             <a:ext uri="{91240B29-F687-4f45-9708-019B960494DF}">
-              <a14:hiddenLine xmlns:a14="http://schemas.microsoft.com/office/drawing/2010/main" xmlns="" w="9525">
+              <a14:hiddenLine xmlns="" xmlns:a14="http://schemas.microsoft.com/office/drawing/2010/main" w="9525">
                 <a:solidFill>
                   <a:srgbClr val="000000"/>
                 </a:solidFill>
@@ -8207,14 +8207,14 @@
           <a:effectLst/>
           <a:extLst>
             <a:ext uri="{909E8E84-426E-40dd-AFC4-6F175D3DCCD1}">
-              <a14:hiddenFill xmlns:a14="http://schemas.microsoft.com/office/drawing/2010/main" xmlns="">
+              <a14:hiddenFill xmlns="" xmlns:a14="http://schemas.microsoft.com/office/drawing/2010/main">
                 <a:solidFill>
                   <a:srgbClr val="FFFFFF"/>
                 </a:solidFill>
               </a14:hiddenFill>
             </a:ext>
             <a:ext uri="{91240B29-F687-4f45-9708-019B960494DF}">
-              <a14:hiddenLine xmlns:a14="http://schemas.microsoft.com/office/drawing/2010/main" xmlns="" w="12700">
+              <a14:hiddenLine xmlns="" xmlns:a14="http://schemas.microsoft.com/office/drawing/2010/main" w="12700">
                 <a:solidFill>
                   <a:srgbClr val="000000"/>
                 </a:solidFill>
@@ -8224,7 +8224,7 @@
               </a14:hiddenLine>
             </a:ext>
             <a:ext uri="{AF507438-7753-43e0-B8FC-AC1667EBCBE1}">
-              <a14:hiddenEffects xmlns:a14="http://schemas.microsoft.com/office/drawing/2010/main" xmlns="">
+              <a14:hiddenEffects xmlns="" xmlns:a14="http://schemas.microsoft.com/office/drawing/2010/main">
                 <a:effectLst>
                   <a:outerShdw blurRad="63500" dist="38099" dir="2700000" algn="ctr" rotWithShape="0">
                     <a:srgbClr val="000000">
@@ -8965,14 +8965,14 @@
           </a:ln>
           <a:extLst>
             <a:ext uri="{909E8E84-426E-40dd-AFC4-6F175D3DCCD1}">
-              <a14:hiddenFill xmlns:a14="http://schemas.microsoft.com/office/drawing/2010/main" xmlns="">
+              <a14:hiddenFill xmlns="" xmlns:a14="http://schemas.microsoft.com/office/drawing/2010/main">
                 <a:solidFill>
                   <a:srgbClr val="FFFFFF"/>
                 </a:solidFill>
               </a14:hiddenFill>
             </a:ext>
             <a:ext uri="{91240B29-F687-4f45-9708-019B960494DF}">
-              <a14:hiddenLine xmlns:a14="http://schemas.microsoft.com/office/drawing/2010/main" xmlns="" w="9525">
+              <a14:hiddenLine xmlns="" xmlns:a14="http://schemas.microsoft.com/office/drawing/2010/main" w="9525">
                 <a:solidFill>
                   <a:srgbClr val="000000"/>
                 </a:solidFill>
@@ -9216,14 +9216,14 @@
           <a:effectLst/>
           <a:extLst>
             <a:ext uri="{909E8E84-426E-40dd-AFC4-6F175D3DCCD1}">
-              <a14:hiddenFill xmlns:a14="http://schemas.microsoft.com/office/drawing/2010/main" xmlns="">
+              <a14:hiddenFill xmlns="" xmlns:a14="http://schemas.microsoft.com/office/drawing/2010/main">
                 <a:solidFill>
                   <a:srgbClr val="FFFFFF"/>
                 </a:solidFill>
               </a14:hiddenFill>
             </a:ext>
             <a:ext uri="{91240B29-F687-4f45-9708-019B960494DF}">
-              <a14:hiddenLine xmlns:a14="http://schemas.microsoft.com/office/drawing/2010/main" xmlns="" w="12700">
+              <a14:hiddenLine xmlns="" xmlns:a14="http://schemas.microsoft.com/office/drawing/2010/main" w="12700">
                 <a:solidFill>
                   <a:srgbClr val="000000"/>
                 </a:solidFill>
@@ -9233,7 +9233,7 @@
               </a14:hiddenLine>
             </a:ext>
             <a:ext uri="{AF507438-7753-43e0-B8FC-AC1667EBCBE1}">
-              <a14:hiddenEffects xmlns:a14="http://schemas.microsoft.com/office/drawing/2010/main" xmlns="">
+              <a14:hiddenEffects xmlns="" xmlns:a14="http://schemas.microsoft.com/office/drawing/2010/main">
                 <a:effectLst>
                   <a:outerShdw blurRad="63500" dist="38099" dir="2700000" algn="ctr" rotWithShape="0">
                     <a:srgbClr val="000000">
@@ -9487,14 +9487,14 @@
           </a:ln>
           <a:extLst>
             <a:ext uri="{909E8E84-426E-40dd-AFC4-6F175D3DCCD1}">
-              <a14:hiddenFill xmlns:a14="http://schemas.microsoft.com/office/drawing/2010/main" xmlns="">
+              <a14:hiddenFill xmlns="" xmlns:a14="http://schemas.microsoft.com/office/drawing/2010/main">
                 <a:solidFill>
                   <a:srgbClr val="FFFFFF"/>
                 </a:solidFill>
               </a14:hiddenFill>
             </a:ext>
             <a:ext uri="{91240B29-F687-4f45-9708-019B960494DF}">
-              <a14:hiddenLine xmlns:a14="http://schemas.microsoft.com/office/drawing/2010/main" xmlns="" w="9525">
+              <a14:hiddenLine xmlns="" xmlns:a14="http://schemas.microsoft.com/office/drawing/2010/main" w="9525">
                 <a:solidFill>
                   <a:srgbClr val="000000"/>
                 </a:solidFill>
@@ -9821,14 +9821,14 @@
           <a:effectLst/>
           <a:extLst>
             <a:ext uri="{909E8E84-426E-40dd-AFC4-6F175D3DCCD1}">
-              <a14:hiddenFill xmlns:a14="http://schemas.microsoft.com/office/drawing/2010/main" xmlns="">
+              <a14:hiddenFill xmlns="" xmlns:a14="http://schemas.microsoft.com/office/drawing/2010/main">
                 <a:solidFill>
                   <a:srgbClr val="FFFFFF"/>
                 </a:solidFill>
               </a14:hiddenFill>
             </a:ext>
             <a:ext uri="{91240B29-F687-4f45-9708-019B960494DF}">
-              <a14:hiddenLine xmlns:a14="http://schemas.microsoft.com/office/drawing/2010/main" xmlns="" w="12700">
+              <a14:hiddenLine xmlns="" xmlns:a14="http://schemas.microsoft.com/office/drawing/2010/main" w="12700">
                 <a:solidFill>
                   <a:srgbClr val="000000"/>
                 </a:solidFill>
@@ -9838,7 +9838,7 @@
               </a14:hiddenLine>
             </a:ext>
             <a:ext uri="{AF507438-7753-43e0-B8FC-AC1667EBCBE1}">
-              <a14:hiddenEffects xmlns:a14="http://schemas.microsoft.com/office/drawing/2010/main" xmlns="">
+              <a14:hiddenEffects xmlns="" xmlns:a14="http://schemas.microsoft.com/office/drawing/2010/main">
                 <a:effectLst>
                   <a:outerShdw blurRad="63500" dist="38099" dir="2700000" algn="ctr" rotWithShape="0">
                     <a:srgbClr val="000000">
@@ -10517,14 +10517,14 @@
           </a:ln>
           <a:extLst>
             <a:ext uri="{909E8E84-426E-40dd-AFC4-6F175D3DCCD1}">
-              <a14:hiddenFill xmlns:a14="http://schemas.microsoft.com/office/drawing/2010/main" xmlns="">
+              <a14:hiddenFill xmlns="" xmlns:a14="http://schemas.microsoft.com/office/drawing/2010/main">
                 <a:solidFill>
                   <a:srgbClr val="FFFFFF"/>
                 </a:solidFill>
               </a14:hiddenFill>
             </a:ext>
             <a:ext uri="{91240B29-F687-4f45-9708-019B960494DF}">
-              <a14:hiddenLine xmlns:a14="http://schemas.microsoft.com/office/drawing/2010/main" xmlns="" w="9525">
+              <a14:hiddenLine xmlns="" xmlns:a14="http://schemas.microsoft.com/office/drawing/2010/main" w="9525">
                 <a:solidFill>
                   <a:srgbClr val="000000"/>
                 </a:solidFill>
@@ -10851,14 +10851,14 @@
           <a:effectLst/>
           <a:extLst>
             <a:ext uri="{909E8E84-426E-40dd-AFC4-6F175D3DCCD1}">
-              <a14:hiddenFill xmlns:a14="http://schemas.microsoft.com/office/drawing/2010/main" xmlns="">
+              <a14:hiddenFill xmlns="" xmlns:a14="http://schemas.microsoft.com/office/drawing/2010/main">
                 <a:solidFill>
                   <a:srgbClr val="FFFFFF"/>
                 </a:solidFill>
               </a14:hiddenFill>
             </a:ext>
             <a:ext uri="{91240B29-F687-4f45-9708-019B960494DF}">
-              <a14:hiddenLine xmlns:a14="http://schemas.microsoft.com/office/drawing/2010/main" xmlns="" w="12700">
+              <a14:hiddenLine xmlns="" xmlns:a14="http://schemas.microsoft.com/office/drawing/2010/main" w="12700">
                 <a:solidFill>
                   <a:srgbClr val="000000"/>
                 </a:solidFill>
@@ -10868,7 +10868,7 @@
               </a14:hiddenLine>
             </a:ext>
             <a:ext uri="{AF507438-7753-43e0-B8FC-AC1667EBCBE1}">
-              <a14:hiddenEffects xmlns:a14="http://schemas.microsoft.com/office/drawing/2010/main" xmlns="">
+              <a14:hiddenEffects xmlns="" xmlns:a14="http://schemas.microsoft.com/office/drawing/2010/main">
                 <a:effectLst>
                   <a:outerShdw blurRad="63500" dist="38099" dir="2700000" algn="ctr" rotWithShape="0">
                     <a:srgbClr val="000000">
@@ -11672,14 +11672,14 @@
           </a:ln>
           <a:extLst>
             <a:ext uri="{909E8E84-426E-40dd-AFC4-6F175D3DCCD1}">
-              <a14:hiddenFill xmlns:a14="http://schemas.microsoft.com/office/drawing/2010/main" xmlns="">
+              <a14:hiddenFill xmlns="" xmlns:a14="http://schemas.microsoft.com/office/drawing/2010/main">
                 <a:solidFill>
                   <a:srgbClr val="FFFFFF"/>
                 </a:solidFill>
               </a14:hiddenFill>
             </a:ext>
             <a:ext uri="{91240B29-F687-4f45-9708-019B960494DF}">
-              <a14:hiddenLine xmlns:a14="http://schemas.microsoft.com/office/drawing/2010/main" xmlns="" w="9525">
+              <a14:hiddenLine xmlns="" xmlns:a14="http://schemas.microsoft.com/office/drawing/2010/main" w="9525">
                 <a:solidFill>
                   <a:srgbClr val="000000"/>
                 </a:solidFill>
@@ -12006,14 +12006,14 @@
           <a:effectLst/>
           <a:extLst>
             <a:ext uri="{909E8E84-426E-40dd-AFC4-6F175D3DCCD1}">
-              <a14:hiddenFill xmlns:a14="http://schemas.microsoft.com/office/drawing/2010/main" xmlns="">
+              <a14:hiddenFill xmlns="" xmlns:a14="http://schemas.microsoft.com/office/drawing/2010/main">
                 <a:solidFill>
                   <a:srgbClr val="FFFFFF"/>
                 </a:solidFill>
               </a14:hiddenFill>
             </a:ext>
             <a:ext uri="{91240B29-F687-4f45-9708-019B960494DF}">
-              <a14:hiddenLine xmlns:a14="http://schemas.microsoft.com/office/drawing/2010/main" xmlns="" w="12700">
+              <a14:hiddenLine xmlns="" xmlns:a14="http://schemas.microsoft.com/office/drawing/2010/main" w="12700">
                 <a:solidFill>
                   <a:srgbClr val="000000"/>
                 </a:solidFill>
@@ -12023,7 +12023,7 @@
               </a14:hiddenLine>
             </a:ext>
             <a:ext uri="{AF507438-7753-43e0-B8FC-AC1667EBCBE1}">
-              <a14:hiddenEffects xmlns:a14="http://schemas.microsoft.com/office/drawing/2010/main" xmlns="">
+              <a14:hiddenEffects xmlns="" xmlns:a14="http://schemas.microsoft.com/office/drawing/2010/main">
                 <a:effectLst>
                   <a:outerShdw blurRad="63500" dist="38099" dir="2700000" algn="ctr" rotWithShape="0">
                     <a:srgbClr val="000000">
@@ -12783,14 +12783,14 @@
           </a:ln>
           <a:extLst>
             <a:ext uri="{909E8E84-426E-40dd-AFC4-6F175D3DCCD1}">
-              <a14:hiddenFill xmlns:a14="http://schemas.microsoft.com/office/drawing/2010/main" xmlns="">
+              <a14:hiddenFill xmlns="" xmlns:a14="http://schemas.microsoft.com/office/drawing/2010/main">
                 <a:solidFill>
                   <a:srgbClr val="FFFFFF"/>
                 </a:solidFill>
               </a14:hiddenFill>
             </a:ext>
             <a:ext uri="{91240B29-F687-4f45-9708-019B960494DF}">
-              <a14:hiddenLine xmlns:a14="http://schemas.microsoft.com/office/drawing/2010/main" xmlns="" w="9525">
+              <a14:hiddenLine xmlns="" xmlns:a14="http://schemas.microsoft.com/office/drawing/2010/main" w="9525">
                 <a:solidFill>
                   <a:srgbClr val="000000"/>
                 </a:solidFill>
@@ -13117,14 +13117,14 @@
           <a:effectLst/>
           <a:extLst>
             <a:ext uri="{909E8E84-426E-40dd-AFC4-6F175D3DCCD1}">
-              <a14:hiddenFill xmlns:a14="http://schemas.microsoft.com/office/drawing/2010/main" xmlns="">
+              <a14:hiddenFill xmlns="" xmlns:a14="http://schemas.microsoft.com/office/drawing/2010/main">
                 <a:solidFill>
                   <a:srgbClr val="FFFFFF"/>
                 </a:solidFill>
               </a14:hiddenFill>
             </a:ext>
             <a:ext uri="{91240B29-F687-4f45-9708-019B960494DF}">
-              <a14:hiddenLine xmlns:a14="http://schemas.microsoft.com/office/drawing/2010/main" xmlns="" w="12700">
+              <a14:hiddenLine xmlns="" xmlns:a14="http://schemas.microsoft.com/office/drawing/2010/main" w="12700">
                 <a:solidFill>
                   <a:srgbClr val="000000"/>
                 </a:solidFill>
@@ -13134,7 +13134,7 @@
               </a14:hiddenLine>
             </a:ext>
             <a:ext uri="{AF507438-7753-43e0-B8FC-AC1667EBCBE1}">
-              <a14:hiddenEffects xmlns:a14="http://schemas.microsoft.com/office/drawing/2010/main" xmlns="">
+              <a14:hiddenEffects xmlns="" xmlns:a14="http://schemas.microsoft.com/office/drawing/2010/main">
                 <a:effectLst>
                   <a:outerShdw blurRad="63500" dist="38099" dir="2700000" algn="ctr" rotWithShape="0">
                     <a:srgbClr val="000000">
@@ -13894,14 +13894,14 @@
           </a:ln>
           <a:extLst>
             <a:ext uri="{909E8E84-426E-40dd-AFC4-6F175D3DCCD1}">
-              <a14:hiddenFill xmlns:a14="http://schemas.microsoft.com/office/drawing/2010/main" xmlns="">
+              <a14:hiddenFill xmlns="" xmlns:a14="http://schemas.microsoft.com/office/drawing/2010/main">
                 <a:solidFill>
                   <a:srgbClr val="FFFFFF"/>
                 </a:solidFill>
               </a14:hiddenFill>
             </a:ext>
             <a:ext uri="{91240B29-F687-4f45-9708-019B960494DF}">
-              <a14:hiddenLine xmlns:a14="http://schemas.microsoft.com/office/drawing/2010/main" xmlns="" w="9525">
+              <a14:hiddenLine xmlns="" xmlns:a14="http://schemas.microsoft.com/office/drawing/2010/main" w="9525">
                 <a:solidFill>
                   <a:srgbClr val="000000"/>
                 </a:solidFill>
@@ -14228,14 +14228,14 @@
           <a:effectLst/>
           <a:extLst>
             <a:ext uri="{909E8E84-426E-40dd-AFC4-6F175D3DCCD1}">
-              <a14:hiddenFill xmlns:a14="http://schemas.microsoft.com/office/drawing/2010/main" xmlns="">
+              <a14:hiddenFill xmlns="" xmlns:a14="http://schemas.microsoft.com/office/drawing/2010/main">
                 <a:solidFill>
                   <a:srgbClr val="FFFFFF"/>
                 </a:solidFill>
               </a14:hiddenFill>
             </a:ext>
             <a:ext uri="{91240B29-F687-4f45-9708-019B960494DF}">
-              <a14:hiddenLine xmlns:a14="http://schemas.microsoft.com/office/drawing/2010/main" xmlns="" w="12700">
+              <a14:hiddenLine xmlns="" xmlns:a14="http://schemas.microsoft.com/office/drawing/2010/main" w="12700">
                 <a:solidFill>
                   <a:srgbClr val="000000"/>
                 </a:solidFill>
@@ -14245,7 +14245,7 @@
               </a14:hiddenLine>
             </a:ext>
             <a:ext uri="{AF507438-7753-43e0-B8FC-AC1667EBCBE1}">
-              <a14:hiddenEffects xmlns:a14="http://schemas.microsoft.com/office/drawing/2010/main" xmlns="">
+              <a14:hiddenEffects xmlns="" xmlns:a14="http://schemas.microsoft.com/office/drawing/2010/main">
                 <a:effectLst>
                   <a:outerShdw blurRad="63500" dist="38099" dir="2700000" algn="ctr" rotWithShape="0">
                     <a:srgbClr val="000000">
@@ -14546,14 +14546,14 @@
           </a:ln>
           <a:extLst>
             <a:ext uri="{909E8E84-426E-40dd-AFC4-6F175D3DCCD1}">
-              <a14:hiddenFill xmlns:a14="http://schemas.microsoft.com/office/drawing/2010/main" xmlns="">
+              <a14:hiddenFill xmlns="" xmlns:a14="http://schemas.microsoft.com/office/drawing/2010/main">
                 <a:solidFill>
                   <a:srgbClr val="FFFFFF"/>
                 </a:solidFill>
               </a14:hiddenFill>
             </a:ext>
             <a:ext uri="{91240B29-F687-4f45-9708-019B960494DF}">
-              <a14:hiddenLine xmlns:a14="http://schemas.microsoft.com/office/drawing/2010/main" xmlns="" w="9525">
+              <a14:hiddenLine xmlns="" xmlns:a14="http://schemas.microsoft.com/office/drawing/2010/main" w="9525">
                 <a:solidFill>
                   <a:srgbClr val="000000"/>
                 </a:solidFill>
@@ -14880,14 +14880,14 @@
           <a:effectLst/>
           <a:extLst>
             <a:ext uri="{909E8E84-426E-40dd-AFC4-6F175D3DCCD1}">
-              <a14:hiddenFill xmlns:a14="http://schemas.microsoft.com/office/drawing/2010/main" xmlns="">
+              <a14:hiddenFill xmlns="" xmlns:a14="http://schemas.microsoft.com/office/drawing/2010/main">
                 <a:solidFill>
                   <a:srgbClr val="FFFFFF"/>
                 </a:solidFill>
               </a14:hiddenFill>
             </a:ext>
             <a:ext uri="{91240B29-F687-4f45-9708-019B960494DF}">
-              <a14:hiddenLine xmlns:a14="http://schemas.microsoft.com/office/drawing/2010/main" xmlns="" w="12700">
+              <a14:hiddenLine xmlns="" xmlns:a14="http://schemas.microsoft.com/office/drawing/2010/main" w="12700">
                 <a:solidFill>
                   <a:srgbClr val="000000"/>
                 </a:solidFill>
@@ -14897,7 +14897,7 @@
               </a14:hiddenLine>
             </a:ext>
             <a:ext uri="{AF507438-7753-43e0-B8FC-AC1667EBCBE1}">
-              <a14:hiddenEffects xmlns:a14="http://schemas.microsoft.com/office/drawing/2010/main" xmlns="">
+              <a14:hiddenEffects xmlns="" xmlns:a14="http://schemas.microsoft.com/office/drawing/2010/main">
                 <a:effectLst>
                   <a:outerShdw blurRad="63500" dist="38099" dir="2700000" algn="ctr" rotWithShape="0">
                     <a:srgbClr val="000000">
@@ -15128,14 +15128,14 @@
           </a:ln>
           <a:extLst>
             <a:ext uri="{909E8E84-426E-40dd-AFC4-6F175D3DCCD1}">
-              <a14:hiddenFill xmlns:a14="http://schemas.microsoft.com/office/drawing/2010/main" xmlns="">
+              <a14:hiddenFill xmlns="" xmlns:a14="http://schemas.microsoft.com/office/drawing/2010/main">
                 <a:solidFill>
                   <a:srgbClr val="FFFFFF"/>
                 </a:solidFill>
               </a14:hiddenFill>
             </a:ext>
             <a:ext uri="{91240B29-F687-4f45-9708-019B960494DF}">
-              <a14:hiddenLine xmlns:a14="http://schemas.microsoft.com/office/drawing/2010/main" xmlns="" w="9525">
+              <a14:hiddenLine xmlns="" xmlns:a14="http://schemas.microsoft.com/office/drawing/2010/main" w="9525">
                 <a:solidFill>
                   <a:srgbClr val="000000"/>
                 </a:solidFill>
@@ -15556,14 +15556,14 @@
           <a:effectLst/>
           <a:extLst>
             <a:ext uri="{909E8E84-426E-40dd-AFC4-6F175D3DCCD1}">
-              <a14:hiddenFill xmlns:a14="http://schemas.microsoft.com/office/drawing/2010/main" xmlns="">
+              <a14:hiddenFill xmlns="" xmlns:a14="http://schemas.microsoft.com/office/drawing/2010/main">
                 <a:solidFill>
                   <a:srgbClr val="FFFFFF"/>
                 </a:solidFill>
               </a14:hiddenFill>
             </a:ext>
             <a:ext uri="{91240B29-F687-4f45-9708-019B960494DF}">
-              <a14:hiddenLine xmlns:a14="http://schemas.microsoft.com/office/drawing/2010/main" xmlns="" w="12700">
+              <a14:hiddenLine xmlns="" xmlns:a14="http://schemas.microsoft.com/office/drawing/2010/main" w="12700">
                 <a:solidFill>
                   <a:srgbClr val="000000"/>
                 </a:solidFill>
@@ -15573,7 +15573,7 @@
               </a14:hiddenLine>
             </a:ext>
             <a:ext uri="{AF507438-7753-43e0-B8FC-AC1667EBCBE1}">
-              <a14:hiddenEffects xmlns:a14="http://schemas.microsoft.com/office/drawing/2010/main" xmlns="">
+              <a14:hiddenEffects xmlns="" xmlns:a14="http://schemas.microsoft.com/office/drawing/2010/main">
                 <a:effectLst>
                   <a:outerShdw blurRad="63500" dist="38099" dir="2700000" algn="ctr" rotWithShape="0">
                     <a:srgbClr val="000000">
@@ -16235,14 +16235,14 @@
           <a:effectLst/>
           <a:extLst>
             <a:ext uri="{909E8E84-426E-40dd-AFC4-6F175D3DCCD1}">
-              <a14:hiddenFill xmlns:a14="http://schemas.microsoft.com/office/drawing/2010/main" xmlns="">
+              <a14:hiddenFill xmlns="" xmlns:a14="http://schemas.microsoft.com/office/drawing/2010/main">
                 <a:solidFill>
                   <a:srgbClr val="FFFFFF"/>
                 </a:solidFill>
               </a14:hiddenFill>
             </a:ext>
             <a:ext uri="{91240B29-F687-4f45-9708-019B960494DF}">
-              <a14:hiddenLine xmlns:a14="http://schemas.microsoft.com/office/drawing/2010/main" xmlns="" w="12700">
+              <a14:hiddenLine xmlns="" xmlns:a14="http://schemas.microsoft.com/office/drawing/2010/main" w="12700">
                 <a:solidFill>
                   <a:srgbClr val="000000"/>
                 </a:solidFill>
@@ -16252,7 +16252,7 @@
               </a14:hiddenLine>
             </a:ext>
             <a:ext uri="{AF507438-7753-43e0-B8FC-AC1667EBCBE1}">
-              <a14:hiddenEffects xmlns:a14="http://schemas.microsoft.com/office/drawing/2010/main" xmlns="">
+              <a14:hiddenEffects xmlns="" xmlns:a14="http://schemas.microsoft.com/office/drawing/2010/main">
                 <a:effectLst>
                   <a:outerShdw blurRad="63500" dist="38099" dir="2700000" algn="ctr" rotWithShape="0">
                     <a:srgbClr val="000000">
@@ -16683,14 +16683,14 @@
           <a:effectLst/>
           <a:extLst>
             <a:ext uri="{909E8E84-426E-40dd-AFC4-6F175D3DCCD1}">
-              <a14:hiddenFill xmlns:a14="http://schemas.microsoft.com/office/drawing/2010/main" xmlns="">
+              <a14:hiddenFill xmlns="" xmlns:a14="http://schemas.microsoft.com/office/drawing/2010/main">
                 <a:solidFill>
                   <a:srgbClr val="FFFFFF"/>
                 </a:solidFill>
               </a14:hiddenFill>
             </a:ext>
             <a:ext uri="{91240B29-F687-4f45-9708-019B960494DF}">
-              <a14:hiddenLine xmlns:a14="http://schemas.microsoft.com/office/drawing/2010/main" xmlns="" w="12700">
+              <a14:hiddenLine xmlns="" xmlns:a14="http://schemas.microsoft.com/office/drawing/2010/main" w="12700">
                 <a:solidFill>
                   <a:srgbClr val="000000"/>
                 </a:solidFill>
@@ -16700,7 +16700,7 @@
               </a14:hiddenLine>
             </a:ext>
             <a:ext uri="{AF507438-7753-43e0-B8FC-AC1667EBCBE1}">
-              <a14:hiddenEffects xmlns:a14="http://schemas.microsoft.com/office/drawing/2010/main" xmlns="">
+              <a14:hiddenEffects xmlns="" xmlns:a14="http://schemas.microsoft.com/office/drawing/2010/main">
                 <a:effectLst>
                   <a:outerShdw blurRad="63500" dist="38099" dir="2700000" algn="ctr" rotWithShape="0">
                     <a:srgbClr val="000000">
@@ -17055,14 +17055,14 @@
           <a:effectLst/>
           <a:extLst>
             <a:ext uri="{909E8E84-426E-40dd-AFC4-6F175D3DCCD1}">
-              <a14:hiddenFill xmlns:a14="http://schemas.microsoft.com/office/drawing/2010/main" xmlns="">
+              <a14:hiddenFill xmlns="" xmlns:a14="http://schemas.microsoft.com/office/drawing/2010/main">
                 <a:solidFill>
                   <a:srgbClr val="FFFFFF"/>
                 </a:solidFill>
               </a14:hiddenFill>
             </a:ext>
             <a:ext uri="{91240B29-F687-4f45-9708-019B960494DF}">
-              <a14:hiddenLine xmlns:a14="http://schemas.microsoft.com/office/drawing/2010/main" xmlns="" w="12700">
+              <a14:hiddenLine xmlns="" xmlns:a14="http://schemas.microsoft.com/office/drawing/2010/main" w="12700">
                 <a:solidFill>
                   <a:srgbClr val="000000"/>
                 </a:solidFill>
@@ -17072,7 +17072,7 @@
               </a14:hiddenLine>
             </a:ext>
             <a:ext uri="{AF507438-7753-43e0-B8FC-AC1667EBCBE1}">
-              <a14:hiddenEffects xmlns:a14="http://schemas.microsoft.com/office/drawing/2010/main" xmlns="">
+              <a14:hiddenEffects xmlns="" xmlns:a14="http://schemas.microsoft.com/office/drawing/2010/main">
                 <a:effectLst>
                   <a:outerShdw blurRad="63500" dist="38099" dir="2700000" algn="ctr" rotWithShape="0">
                     <a:srgbClr val="000000">
@@ -17650,14 +17650,14 @@
           <a:effectLst/>
           <a:extLst>
             <a:ext uri="{909E8E84-426E-40dd-AFC4-6F175D3DCCD1}">
-              <a14:hiddenFill xmlns:a14="http://schemas.microsoft.com/office/drawing/2010/main" xmlns="">
+              <a14:hiddenFill xmlns="" xmlns:a14="http://schemas.microsoft.com/office/drawing/2010/main">
                 <a:solidFill>
                   <a:srgbClr val="FFFFFF"/>
                 </a:solidFill>
               </a14:hiddenFill>
             </a:ext>
             <a:ext uri="{91240B29-F687-4f45-9708-019B960494DF}">
-              <a14:hiddenLine xmlns:a14="http://schemas.microsoft.com/office/drawing/2010/main" xmlns="" w="12700">
+              <a14:hiddenLine xmlns="" xmlns:a14="http://schemas.microsoft.com/office/drawing/2010/main" w="12700">
                 <a:solidFill>
                   <a:srgbClr val="000000"/>
                 </a:solidFill>
@@ -17667,7 +17667,7 @@
               </a14:hiddenLine>
             </a:ext>
             <a:ext uri="{AF507438-7753-43e0-B8FC-AC1667EBCBE1}">
-              <a14:hiddenEffects xmlns:a14="http://schemas.microsoft.com/office/drawing/2010/main" xmlns="">
+              <a14:hiddenEffects xmlns="" xmlns:a14="http://schemas.microsoft.com/office/drawing/2010/main">
                 <a:effectLst>
                   <a:outerShdw blurRad="63500" dist="38099" dir="2700000" algn="ctr" rotWithShape="0">
                     <a:srgbClr val="000000">
@@ -18528,14 +18528,14 @@
           <a:effectLst/>
           <a:extLst>
             <a:ext uri="{909E8E84-426E-40dd-AFC4-6F175D3DCCD1}">
-              <a14:hiddenFill xmlns:a14="http://schemas.microsoft.com/office/drawing/2010/main" xmlns="">
+              <a14:hiddenFill xmlns="" xmlns:a14="http://schemas.microsoft.com/office/drawing/2010/main">
                 <a:solidFill>
                   <a:srgbClr val="FFFFFF"/>
                 </a:solidFill>
               </a14:hiddenFill>
             </a:ext>
             <a:ext uri="{91240B29-F687-4f45-9708-019B960494DF}">
-              <a14:hiddenLine xmlns:a14="http://schemas.microsoft.com/office/drawing/2010/main" xmlns="" w="12700">
+              <a14:hiddenLine xmlns="" xmlns:a14="http://schemas.microsoft.com/office/drawing/2010/main" w="12700">
                 <a:solidFill>
                   <a:srgbClr val="000000"/>
                 </a:solidFill>
@@ -18545,7 +18545,7 @@
               </a14:hiddenLine>
             </a:ext>
             <a:ext uri="{AF507438-7753-43e0-B8FC-AC1667EBCBE1}">
-              <a14:hiddenEffects xmlns:a14="http://schemas.microsoft.com/office/drawing/2010/main" xmlns="">
+              <a14:hiddenEffects xmlns="" xmlns:a14="http://schemas.microsoft.com/office/drawing/2010/main">
                 <a:effectLst>
                   <a:outerShdw blurRad="63500" dist="38099" dir="2700000" algn="ctr" rotWithShape="0">
                     <a:srgbClr val="000000">
@@ -19137,14 +19137,14 @@
           <a:effectLst/>
           <a:extLst>
             <a:ext uri="{909E8E84-426E-40dd-AFC4-6F175D3DCCD1}">
-              <a14:hiddenFill xmlns:a14="http://schemas.microsoft.com/office/drawing/2010/main" xmlns="">
+              <a14:hiddenFill xmlns="" xmlns:a14="http://schemas.microsoft.com/office/drawing/2010/main">
                 <a:solidFill>
                   <a:srgbClr val="FFFFFF"/>
                 </a:solidFill>
               </a14:hiddenFill>
             </a:ext>
             <a:ext uri="{91240B29-F687-4f45-9708-019B960494DF}">
-              <a14:hiddenLine xmlns:a14="http://schemas.microsoft.com/office/drawing/2010/main" xmlns="" w="12700">
+              <a14:hiddenLine xmlns="" xmlns:a14="http://schemas.microsoft.com/office/drawing/2010/main" w="12700">
                 <a:solidFill>
                   <a:srgbClr val="000000"/>
                 </a:solidFill>
@@ -19154,7 +19154,7 @@
               </a14:hiddenLine>
             </a:ext>
             <a:ext uri="{AF507438-7753-43e0-B8FC-AC1667EBCBE1}">
-              <a14:hiddenEffects xmlns:a14="http://schemas.microsoft.com/office/drawing/2010/main" xmlns="">
+              <a14:hiddenEffects xmlns="" xmlns:a14="http://schemas.microsoft.com/office/drawing/2010/main">
                 <a:effectLst>
                   <a:outerShdw blurRad="63500" dist="38099" dir="2700000" algn="ctr" rotWithShape="0">
                     <a:srgbClr val="000000">
@@ -20425,14 +20425,14 @@
           <a:effectLst/>
           <a:extLst>
             <a:ext uri="{909E8E84-426E-40dd-AFC4-6F175D3DCCD1}">
-              <a14:hiddenFill xmlns:a14="http://schemas.microsoft.com/office/drawing/2010/main" xmlns="">
+              <a14:hiddenFill xmlns="" xmlns:a14="http://schemas.microsoft.com/office/drawing/2010/main">
                 <a:solidFill>
                   <a:srgbClr val="FFFFFF"/>
                 </a:solidFill>
               </a14:hiddenFill>
             </a:ext>
             <a:ext uri="{91240B29-F687-4f45-9708-019B960494DF}">
-              <a14:hiddenLine xmlns:a14="http://schemas.microsoft.com/office/drawing/2010/main" xmlns="" w="12700">
+              <a14:hiddenLine xmlns="" xmlns:a14="http://schemas.microsoft.com/office/drawing/2010/main" w="12700">
                 <a:solidFill>
                   <a:srgbClr val="000000"/>
                 </a:solidFill>
@@ -20442,7 +20442,7 @@
               </a14:hiddenLine>
             </a:ext>
             <a:ext uri="{AF507438-7753-43e0-B8FC-AC1667EBCBE1}">
-              <a14:hiddenEffects xmlns:a14="http://schemas.microsoft.com/office/drawing/2010/main" xmlns="">
+              <a14:hiddenEffects xmlns="" xmlns:a14="http://schemas.microsoft.com/office/drawing/2010/main">
                 <a:effectLst>
                   <a:outerShdw blurRad="63500" dist="38099" dir="2700000" algn="ctr" rotWithShape="0">
                     <a:srgbClr val="000000">
@@ -21518,14 +21518,14 @@
           <a:effectLst/>
           <a:extLst>
             <a:ext uri="{909E8E84-426E-40dd-AFC4-6F175D3DCCD1}">
-              <a14:hiddenFill xmlns:a14="http://schemas.microsoft.com/office/drawing/2010/main" xmlns="">
+              <a14:hiddenFill xmlns="" xmlns:a14="http://schemas.microsoft.com/office/drawing/2010/main">
                 <a:solidFill>
                   <a:srgbClr val="FFFFFF"/>
                 </a:solidFill>
               </a14:hiddenFill>
             </a:ext>
             <a:ext uri="{91240B29-F687-4f45-9708-019B960494DF}">
-              <a14:hiddenLine xmlns:a14="http://schemas.microsoft.com/office/drawing/2010/main" xmlns="" w="12700">
+              <a14:hiddenLine xmlns="" xmlns:a14="http://schemas.microsoft.com/office/drawing/2010/main" w="12700">
                 <a:solidFill>
                   <a:srgbClr val="000000"/>
                 </a:solidFill>
@@ -21535,7 +21535,7 @@
               </a14:hiddenLine>
             </a:ext>
             <a:ext uri="{AF507438-7753-43e0-B8FC-AC1667EBCBE1}">
-              <a14:hiddenEffects xmlns:a14="http://schemas.microsoft.com/office/drawing/2010/main" xmlns="">
+              <a14:hiddenEffects xmlns="" xmlns:a14="http://schemas.microsoft.com/office/drawing/2010/main">
                 <a:effectLst>
                   <a:outerShdw blurRad="63500" dist="38099" dir="2700000" algn="ctr" rotWithShape="0">
                     <a:srgbClr val="000000">
@@ -22611,14 +22611,14 @@
           <a:effectLst/>
           <a:extLst>
             <a:ext uri="{909E8E84-426E-40dd-AFC4-6F175D3DCCD1}">
-              <a14:hiddenFill xmlns:a14="http://schemas.microsoft.com/office/drawing/2010/main" xmlns="">
+              <a14:hiddenFill xmlns="" xmlns:a14="http://schemas.microsoft.com/office/drawing/2010/main">
                 <a:solidFill>
                   <a:srgbClr val="FFFFFF"/>
                 </a:solidFill>
               </a14:hiddenFill>
             </a:ext>
             <a:ext uri="{91240B29-F687-4f45-9708-019B960494DF}">
-              <a14:hiddenLine xmlns:a14="http://schemas.microsoft.com/office/drawing/2010/main" xmlns="" w="12700">
+              <a14:hiddenLine xmlns="" xmlns:a14="http://schemas.microsoft.com/office/drawing/2010/main" w="12700">
                 <a:solidFill>
                   <a:srgbClr val="000000"/>
                 </a:solidFill>
@@ -22628,7 +22628,7 @@
               </a14:hiddenLine>
             </a:ext>
             <a:ext uri="{AF507438-7753-43e0-B8FC-AC1667EBCBE1}">
-              <a14:hiddenEffects xmlns:a14="http://schemas.microsoft.com/office/drawing/2010/main" xmlns="">
+              <a14:hiddenEffects xmlns="" xmlns:a14="http://schemas.microsoft.com/office/drawing/2010/main">
                 <a:effectLst>
                   <a:outerShdw blurRad="63500" dist="38099" dir="2700000" algn="ctr" rotWithShape="0">
                     <a:srgbClr val="000000">
@@ -23183,14 +23183,14 @@
           <a:effectLst/>
           <a:extLst>
             <a:ext uri="{909E8E84-426E-40dd-AFC4-6F175D3DCCD1}">
-              <a14:hiddenFill xmlns:a14="http://schemas.microsoft.com/office/drawing/2010/main" xmlns="">
+              <a14:hiddenFill xmlns="" xmlns:a14="http://schemas.microsoft.com/office/drawing/2010/main">
                 <a:solidFill>
                   <a:srgbClr val="FFFFFF"/>
                 </a:solidFill>
               </a14:hiddenFill>
             </a:ext>
             <a:ext uri="{91240B29-F687-4f45-9708-019B960494DF}">
-              <a14:hiddenLine xmlns:a14="http://schemas.microsoft.com/office/drawing/2010/main" xmlns="" w="12700">
+              <a14:hiddenLine xmlns="" xmlns:a14="http://schemas.microsoft.com/office/drawing/2010/main" w="12700">
                 <a:solidFill>
                   <a:srgbClr val="000000"/>
                 </a:solidFill>
@@ -23200,7 +23200,7 @@
               </a14:hiddenLine>
             </a:ext>
             <a:ext uri="{AF507438-7753-43e0-B8FC-AC1667EBCBE1}">
-              <a14:hiddenEffects xmlns:a14="http://schemas.microsoft.com/office/drawing/2010/main" xmlns="">
+              <a14:hiddenEffects xmlns="" xmlns:a14="http://schemas.microsoft.com/office/drawing/2010/main">
                 <a:effectLst>
                   <a:outerShdw blurRad="63500" dist="38099" dir="2700000" algn="ctr" rotWithShape="0">
                     <a:srgbClr val="000000">
@@ -23589,14 +23589,14 @@
           <a:effectLst/>
           <a:extLst>
             <a:ext uri="{909E8E84-426E-40dd-AFC4-6F175D3DCCD1}">
-              <a14:hiddenFill xmlns:a14="http://schemas.microsoft.com/office/drawing/2010/main" xmlns="">
+              <a14:hiddenFill xmlns="" xmlns:a14="http://schemas.microsoft.com/office/drawing/2010/main">
                 <a:solidFill>
                   <a:srgbClr val="FFFFFF"/>
                 </a:solidFill>
               </a14:hiddenFill>
             </a:ext>
             <a:ext uri="{91240B29-F687-4f45-9708-019B960494DF}">
-              <a14:hiddenLine xmlns:a14="http://schemas.microsoft.com/office/drawing/2010/main" xmlns="" w="12700">
+              <a14:hiddenLine xmlns="" xmlns:a14="http://schemas.microsoft.com/office/drawing/2010/main" w="12700">
                 <a:solidFill>
                   <a:srgbClr val="000000"/>
                 </a:solidFill>
@@ -23606,7 +23606,7 @@
               </a14:hiddenLine>
             </a:ext>
             <a:ext uri="{AF507438-7753-43e0-B8FC-AC1667EBCBE1}">
-              <a14:hiddenEffects xmlns:a14="http://schemas.microsoft.com/office/drawing/2010/main" xmlns="">
+              <a14:hiddenEffects xmlns="" xmlns:a14="http://schemas.microsoft.com/office/drawing/2010/main">
                 <a:effectLst>
                   <a:outerShdw blurRad="63500" dist="38099" dir="2700000" algn="ctr" rotWithShape="0">
                     <a:srgbClr val="000000">
@@ -23725,14 +23725,14 @@
           </a:ln>
           <a:extLst>
             <a:ext uri="{909E8E84-426E-40dd-AFC4-6F175D3DCCD1}">
-              <a14:hiddenFill xmlns:a14="http://schemas.microsoft.com/office/drawing/2010/main" xmlns="">
+              <a14:hiddenFill xmlns="" xmlns:a14="http://schemas.microsoft.com/office/drawing/2010/main">
                 <a:solidFill>
                   <a:srgbClr val="FFFFFF"/>
                 </a:solidFill>
               </a14:hiddenFill>
             </a:ext>
             <a:ext uri="{91240B29-F687-4f45-9708-019B960494DF}">
-              <a14:hiddenLine xmlns:a14="http://schemas.microsoft.com/office/drawing/2010/main" xmlns="" w="9525">
+              <a14:hiddenLine xmlns="" xmlns:a14="http://schemas.microsoft.com/office/drawing/2010/main" w="9525">
                 <a:solidFill>
                   <a:srgbClr val="000000"/>
                 </a:solidFill>
@@ -24241,14 +24241,14 @@
           <a:effectLst/>
           <a:extLst>
             <a:ext uri="{909E8E84-426E-40dd-AFC4-6F175D3DCCD1}">
-              <a14:hiddenFill xmlns:a14="http://schemas.microsoft.com/office/drawing/2010/main" xmlns="">
+              <a14:hiddenFill xmlns="" xmlns:a14="http://schemas.microsoft.com/office/drawing/2010/main">
                 <a:solidFill>
                   <a:srgbClr val="FFFFFF"/>
                 </a:solidFill>
               </a14:hiddenFill>
             </a:ext>
             <a:ext uri="{91240B29-F687-4f45-9708-019B960494DF}">
-              <a14:hiddenLine xmlns:a14="http://schemas.microsoft.com/office/drawing/2010/main" xmlns="" w="12700">
+              <a14:hiddenLine xmlns="" xmlns:a14="http://schemas.microsoft.com/office/drawing/2010/main" w="12700">
                 <a:solidFill>
                   <a:srgbClr val="000000"/>
                 </a:solidFill>
@@ -24258,7 +24258,7 @@
               </a14:hiddenLine>
             </a:ext>
             <a:ext uri="{AF507438-7753-43e0-B8FC-AC1667EBCBE1}">
-              <a14:hiddenEffects xmlns:a14="http://schemas.microsoft.com/office/drawing/2010/main" xmlns="">
+              <a14:hiddenEffects xmlns="" xmlns:a14="http://schemas.microsoft.com/office/drawing/2010/main">
                 <a:effectLst>
                   <a:outerShdw blurRad="63500" dist="38099" dir="2700000" algn="ctr" rotWithShape="0">
                     <a:srgbClr val="000000">
@@ -24779,14 +24779,14 @@
           <a:effectLst/>
           <a:extLst>
             <a:ext uri="{909E8E84-426E-40dd-AFC4-6F175D3DCCD1}">
-              <a14:hiddenFill xmlns:a14="http://schemas.microsoft.com/office/drawing/2010/main" xmlns="">
+              <a14:hiddenFill xmlns="" xmlns:a14="http://schemas.microsoft.com/office/drawing/2010/main">
                 <a:solidFill>
                   <a:srgbClr val="FFFFFF"/>
                 </a:solidFill>
               </a14:hiddenFill>
             </a:ext>
             <a:ext uri="{91240B29-F687-4f45-9708-019B960494DF}">
-              <a14:hiddenLine xmlns:a14="http://schemas.microsoft.com/office/drawing/2010/main" xmlns="" w="12700">
+              <a14:hiddenLine xmlns="" xmlns:a14="http://schemas.microsoft.com/office/drawing/2010/main" w="12700">
                 <a:solidFill>
                   <a:srgbClr val="000000"/>
                 </a:solidFill>
@@ -24796,7 +24796,7 @@
               </a14:hiddenLine>
             </a:ext>
             <a:ext uri="{AF507438-7753-43e0-B8FC-AC1667EBCBE1}">
-              <a14:hiddenEffects xmlns:a14="http://schemas.microsoft.com/office/drawing/2010/main" xmlns="">
+              <a14:hiddenEffects xmlns="" xmlns:a14="http://schemas.microsoft.com/office/drawing/2010/main">
                 <a:effectLst>
                   <a:outerShdw blurRad="63500" dist="38099" dir="2700000" algn="ctr" rotWithShape="0">
                     <a:srgbClr val="000000">
@@ -24957,14 +24957,14 @@
           </a:ln>
           <a:extLst>
             <a:ext uri="{909E8E84-426E-40dd-AFC4-6F175D3DCCD1}">
-              <a14:hiddenFill xmlns:a14="http://schemas.microsoft.com/office/drawing/2010/main" xmlns="">
+              <a14:hiddenFill xmlns="" xmlns:a14="http://schemas.microsoft.com/office/drawing/2010/main">
                 <a:solidFill>
                   <a:srgbClr val="FFFFFF"/>
                 </a:solidFill>
               </a14:hiddenFill>
             </a:ext>
             <a:ext uri="{91240B29-F687-4f45-9708-019B960494DF}">
-              <a14:hiddenLine xmlns:a14="http://schemas.microsoft.com/office/drawing/2010/main" xmlns="" w="9525">
+              <a14:hiddenLine xmlns="" xmlns:a14="http://schemas.microsoft.com/office/drawing/2010/main" w="9525">
                 <a:solidFill>
                   <a:srgbClr val="000000"/>
                 </a:solidFill>
@@ -25391,14 +25391,14 @@
           <a:effectLst/>
           <a:extLst>
             <a:ext uri="{909E8E84-426E-40dd-AFC4-6F175D3DCCD1}">
-              <a14:hiddenFill xmlns:a14="http://schemas.microsoft.com/office/drawing/2010/main" xmlns="">
+              <a14:hiddenFill xmlns="" xmlns:a14="http://schemas.microsoft.com/office/drawing/2010/main">
                 <a:solidFill>
                   <a:srgbClr val="FFFFFF"/>
                 </a:solidFill>
               </a14:hiddenFill>
             </a:ext>
             <a:ext uri="{91240B29-F687-4f45-9708-019B960494DF}">
-              <a14:hiddenLine xmlns:a14="http://schemas.microsoft.com/office/drawing/2010/main" xmlns="" w="12700">
+              <a14:hiddenLine xmlns="" xmlns:a14="http://schemas.microsoft.com/office/drawing/2010/main" w="12700">
                 <a:solidFill>
                   <a:srgbClr val="000000"/>
                 </a:solidFill>
@@ -25408,7 +25408,7 @@
               </a14:hiddenLine>
             </a:ext>
             <a:ext uri="{AF507438-7753-43e0-B8FC-AC1667EBCBE1}">
-              <a14:hiddenEffects xmlns:a14="http://schemas.microsoft.com/office/drawing/2010/main" xmlns="">
+              <a14:hiddenEffects xmlns="" xmlns:a14="http://schemas.microsoft.com/office/drawing/2010/main">
                 <a:effectLst>
                   <a:outerShdw blurRad="63500" dist="38099" dir="2700000" algn="ctr" rotWithShape="0">
                     <a:srgbClr val="000000">
@@ -25569,14 +25569,14 @@
           </a:ln>
           <a:extLst>
             <a:ext uri="{909E8E84-426E-40dd-AFC4-6F175D3DCCD1}">
-              <a14:hiddenFill xmlns:a14="http://schemas.microsoft.com/office/drawing/2010/main" xmlns="">
+              <a14:hiddenFill xmlns="" xmlns:a14="http://schemas.microsoft.com/office/drawing/2010/main">
                 <a:solidFill>
                   <a:srgbClr val="FFFFFF"/>
                 </a:solidFill>
               </a14:hiddenFill>
             </a:ext>
             <a:ext uri="{91240B29-F687-4f45-9708-019B960494DF}">
-              <a14:hiddenLine xmlns:a14="http://schemas.microsoft.com/office/drawing/2010/main" xmlns="" w="9525">
+              <a14:hiddenLine xmlns="" xmlns:a14="http://schemas.microsoft.com/office/drawing/2010/main" w="9525">
                 <a:solidFill>
                   <a:srgbClr val="000000"/>
                 </a:solidFill>
@@ -26003,14 +26003,14 @@
           <a:effectLst/>
           <a:extLst>
             <a:ext uri="{909E8E84-426E-40dd-AFC4-6F175D3DCCD1}">
-              <a14:hiddenFill xmlns:a14="http://schemas.microsoft.com/office/drawing/2010/main" xmlns="">
+              <a14:hiddenFill xmlns="" xmlns:a14="http://schemas.microsoft.com/office/drawing/2010/main">
                 <a:solidFill>
                   <a:srgbClr val="FFFFFF"/>
                 </a:solidFill>
               </a14:hiddenFill>
             </a:ext>
             <a:ext uri="{91240B29-F687-4f45-9708-019B960494DF}">
-              <a14:hiddenLine xmlns:a14="http://schemas.microsoft.com/office/drawing/2010/main" xmlns="" w="12700">
+              <a14:hiddenLine xmlns="" xmlns:a14="http://schemas.microsoft.com/office/drawing/2010/main" w="12700">
                 <a:solidFill>
                   <a:srgbClr val="000000"/>
                 </a:solidFill>
@@ -26020,7 +26020,7 @@
               </a14:hiddenLine>
             </a:ext>
             <a:ext uri="{AF507438-7753-43e0-B8FC-AC1667EBCBE1}">
-              <a14:hiddenEffects xmlns:a14="http://schemas.microsoft.com/office/drawing/2010/main" xmlns="">
+              <a14:hiddenEffects xmlns="" xmlns:a14="http://schemas.microsoft.com/office/drawing/2010/main">
                 <a:effectLst>
                   <a:outerShdw blurRad="63500" dist="38099" dir="2700000" algn="ctr" rotWithShape="0">
                     <a:srgbClr val="000000">
@@ -26181,14 +26181,14 @@
           </a:ln>
           <a:extLst>
             <a:ext uri="{909E8E84-426E-40dd-AFC4-6F175D3DCCD1}">
-              <a14:hiddenFill xmlns:a14="http://schemas.microsoft.com/office/drawing/2010/main" xmlns="">
+              <a14:hiddenFill xmlns="" xmlns:a14="http://schemas.microsoft.com/office/drawing/2010/main">
                 <a:solidFill>
                   <a:srgbClr val="FFFFFF"/>
                 </a:solidFill>
               </a14:hiddenFill>
             </a:ext>
             <a:ext uri="{91240B29-F687-4f45-9708-019B960494DF}">
-              <a14:hiddenLine xmlns:a14="http://schemas.microsoft.com/office/drawing/2010/main" xmlns="" w="9525">
+              <a14:hiddenLine xmlns="" xmlns:a14="http://schemas.microsoft.com/office/drawing/2010/main" w="9525">
                 <a:solidFill>
                   <a:srgbClr val="000000"/>
                 </a:solidFill>
@@ -26615,14 +26615,14 @@
           <a:effectLst/>
           <a:extLst>
             <a:ext uri="{909E8E84-426E-40dd-AFC4-6F175D3DCCD1}">
-              <a14:hiddenFill xmlns:a14="http://schemas.microsoft.com/office/drawing/2010/main" xmlns="">
+              <a14:hiddenFill xmlns="" xmlns:a14="http://schemas.microsoft.com/office/drawing/2010/main">
                 <a:solidFill>
                   <a:srgbClr val="FFFFFF"/>
                 </a:solidFill>
               </a14:hiddenFill>
             </a:ext>
             <a:ext uri="{91240B29-F687-4f45-9708-019B960494DF}">
-              <a14:hiddenLine xmlns:a14="http://schemas.microsoft.com/office/drawing/2010/main" xmlns="" w="12700">
+              <a14:hiddenLine xmlns="" xmlns:a14="http://schemas.microsoft.com/office/drawing/2010/main" w="12700">
                 <a:solidFill>
                   <a:srgbClr val="000000"/>
                 </a:solidFill>
@@ -26632,7 +26632,7 @@
               </a14:hiddenLine>
             </a:ext>
             <a:ext uri="{AF507438-7753-43e0-B8FC-AC1667EBCBE1}">
-              <a14:hiddenEffects xmlns:a14="http://schemas.microsoft.com/office/drawing/2010/main" xmlns="">
+              <a14:hiddenEffects xmlns="" xmlns:a14="http://schemas.microsoft.com/office/drawing/2010/main">
                 <a:effectLst>
                   <a:outerShdw blurRad="63500" dist="38099" dir="2700000" algn="ctr" rotWithShape="0">
                     <a:srgbClr val="000000">
@@ -26793,14 +26793,14 @@
           </a:ln>
           <a:extLst>
             <a:ext uri="{909E8E84-426E-40dd-AFC4-6F175D3DCCD1}">
-              <a14:hiddenFill xmlns:a14="http://schemas.microsoft.com/office/drawing/2010/main" xmlns="">
+              <a14:hiddenFill xmlns="" xmlns:a14="http://schemas.microsoft.com/office/drawing/2010/main">
                 <a:solidFill>
                   <a:srgbClr val="FFFFFF"/>
                 </a:solidFill>
               </a14:hiddenFill>
             </a:ext>
             <a:ext uri="{91240B29-F687-4f45-9708-019B960494DF}">
-              <a14:hiddenLine xmlns:a14="http://schemas.microsoft.com/office/drawing/2010/main" xmlns="" w="9525">
+              <a14:hiddenLine xmlns="" xmlns:a14="http://schemas.microsoft.com/office/drawing/2010/main" w="9525">
                 <a:solidFill>
                   <a:srgbClr val="000000"/>
                 </a:solidFill>
@@ -27227,14 +27227,14 @@
           <a:effectLst/>
           <a:extLst>
             <a:ext uri="{909E8E84-426E-40dd-AFC4-6F175D3DCCD1}">
-              <a14:hiddenFill xmlns:a14="http://schemas.microsoft.com/office/drawing/2010/main" xmlns="">
+              <a14:hiddenFill xmlns="" xmlns:a14="http://schemas.microsoft.com/office/drawing/2010/main">
                 <a:solidFill>
                   <a:srgbClr val="FFFFFF"/>
                 </a:solidFill>
               </a14:hiddenFill>
             </a:ext>
             <a:ext uri="{91240B29-F687-4f45-9708-019B960494DF}">
-              <a14:hiddenLine xmlns:a14="http://schemas.microsoft.com/office/drawing/2010/main" xmlns="" w="12700">
+              <a14:hiddenLine xmlns="" xmlns:a14="http://schemas.microsoft.com/office/drawing/2010/main" w="12700">
                 <a:solidFill>
                   <a:srgbClr val="000000"/>
                 </a:solidFill>
@@ -27244,7 +27244,7 @@
               </a14:hiddenLine>
             </a:ext>
             <a:ext uri="{AF507438-7753-43e0-B8FC-AC1667EBCBE1}">
-              <a14:hiddenEffects xmlns:a14="http://schemas.microsoft.com/office/drawing/2010/main" xmlns="">
+              <a14:hiddenEffects xmlns="" xmlns:a14="http://schemas.microsoft.com/office/drawing/2010/main">
                 <a:effectLst>
                   <a:outerShdw blurRad="63500" dist="38099" dir="2700000" algn="ctr" rotWithShape="0">
                     <a:srgbClr val="000000">
@@ -27405,14 +27405,14 @@
           </a:ln>
           <a:extLst>
             <a:ext uri="{909E8E84-426E-40dd-AFC4-6F175D3DCCD1}">
-              <a14:hiddenFill xmlns:a14="http://schemas.microsoft.com/office/drawing/2010/main" xmlns="">
+              <a14:hiddenFill xmlns="" xmlns:a14="http://schemas.microsoft.com/office/drawing/2010/main">
                 <a:solidFill>
                   <a:srgbClr val="FFFFFF"/>
                 </a:solidFill>
               </a14:hiddenFill>
             </a:ext>
             <a:ext uri="{91240B29-F687-4f45-9708-019B960494DF}">
-              <a14:hiddenLine xmlns:a14="http://schemas.microsoft.com/office/drawing/2010/main" xmlns="" w="9525">
+              <a14:hiddenLine xmlns="" xmlns:a14="http://schemas.microsoft.com/office/drawing/2010/main" w="9525">
                 <a:solidFill>
                   <a:srgbClr val="000000"/>
                 </a:solidFill>
@@ -29446,6 +29446,18 @@
               </a:rPr>
             </a:br>
             <a:r>
+              <a:rPr lang="en-US" sz="1800" b="1" dirty="0">
+                <a:solidFill>
+                  <a:schemeClr val="accent4">
+                    <a:lumMod val="50000"/>
+                  </a:schemeClr>
+                </a:solidFill>
+                <a:latin typeface="Courier New"/>
+                <a:cs typeface="Courier New"/>
+              </a:rPr>
+              <a:t>final </a:t>
+            </a:r>
+            <a:r>
               <a:rPr lang="en-US" sz="1800" b="1" dirty="0" err="1">
                 <a:solidFill>
                   <a:schemeClr val="accent4">
@@ -29959,7 +29971,7 @@
                 <a:latin typeface="Courier New"/>
                 <a:cs typeface="Courier New"/>
               </a:rPr>
-              <a:t>lines.flapMap</a:t>
+              <a:t>lines.flatMap</a:t>
             </a:r>
             <a:r>
               <a:rPr lang="en-US" sz="1800" b="1" dirty="0">
@@ -30490,7 +30502,7 @@
             <a:pPr lvl="1"/>
             <a:r>
               <a:rPr lang="en-US" dirty="0"/>
-              <a:t>Left fold reduction</a:t>
+              <a:t>Reduce to a single number</a:t>
             </a:r>
           </a:p>
           <a:p>

</xml_diff>